<commit_message>
2024: add posters, notice, and PowerPoint templates
Oops...
</commit_message>
<xml_diff>
--- a/2024/templates/aoscc-2024-template-v4.pptx
+++ b/2024/templates/aoscc-2024-template-v4.pptx
@@ -5,11 +5,49 @@
     <p:sldMasterId id="2147483648" r:id="rId1"/>
   </p:sldMasterIdLst>
   <p:notesMasterIdLst>
-    <p:notesMasterId r:id="rId3"/>
+    <p:notesMasterId r:id="rId35"/>
   </p:notesMasterIdLst>
   <p:handoutMasterIdLst>
-    <p:handoutMasterId r:id="rId4"/>
+    <p:handoutMasterId r:id="rId40"/>
   </p:handoutMasterIdLst>
+  <p:sldIdLst>
+    <p:sldId id="256" r:id="rId3"/>
+    <p:sldId id="259" r:id="rId4"/>
+    <p:sldId id="258" r:id="rId5"/>
+    <p:sldId id="261" r:id="rId6"/>
+    <p:sldId id="260" r:id="rId7"/>
+    <p:sldId id="262" r:id="rId8"/>
+    <p:sldId id="263" r:id="rId9"/>
+    <p:sldId id="279" r:id="rId10"/>
+    <p:sldId id="291" r:id="rId11"/>
+    <p:sldId id="292" r:id="rId12"/>
+    <p:sldId id="265" r:id="rId13"/>
+    <p:sldId id="271" r:id="rId14"/>
+    <p:sldId id="273" r:id="rId15"/>
+    <p:sldId id="272" r:id="rId16"/>
+    <p:sldId id="266" r:id="rId17"/>
+    <p:sldId id="274" r:id="rId18"/>
+    <p:sldId id="278" r:id="rId19"/>
+    <p:sldId id="267" r:id="rId20"/>
+    <p:sldId id="282" r:id="rId21"/>
+    <p:sldId id="276" r:id="rId22"/>
+    <p:sldId id="275" r:id="rId23"/>
+    <p:sldId id="277" r:id="rId24"/>
+    <p:sldId id="264" r:id="rId25"/>
+    <p:sldId id="269" r:id="rId26"/>
+    <p:sldId id="270" r:id="rId27"/>
+    <p:sldId id="285" r:id="rId28"/>
+    <p:sldId id="268" r:id="rId29"/>
+    <p:sldId id="280" r:id="rId30"/>
+    <p:sldId id="281" r:id="rId31"/>
+    <p:sldId id="283" r:id="rId32"/>
+    <p:sldId id="284" r:id="rId33"/>
+    <p:sldId id="286" r:id="rId34"/>
+    <p:sldId id="293" r:id="rId36"/>
+    <p:sldId id="294" r:id="rId37"/>
+    <p:sldId id="289" r:id="rId38"/>
+    <p:sldId id="288" r:id="rId39"/>
+  </p:sldIdLst>
   <p:sldSz cx="11520170" cy="7198995"/>
   <p:notesSz cx="6858000" cy="9144000"/>
   <p:defaultTextStyle>
@@ -615,6 +653,71 @@
     </a:lvl9pPr>
   </p:notesStyle>
 </p:notesMaster>
+</file>
+
+<file path=ppt/notesSlides/notesSlide1.xml><?xml version="1.0" encoding="utf-8"?>
+<p:notes xmlns:a="http://schemas.openxmlformats.org/drawingml/2006/main" xmlns:r="http://schemas.openxmlformats.org/officeDocument/2006/relationships" xmlns:p="http://schemas.openxmlformats.org/presentationml/2006/main">
+  <p:cSld>
+    <p:spTree>
+      <p:nvGrpSpPr>
+        <p:cNvPr id="1" name=""/>
+        <p:cNvGrpSpPr/>
+        <p:nvPr/>
+      </p:nvGrpSpPr>
+      <p:grpSpPr/>
+      <p:sp>
+        <p:nvSpPr>
+          <p:cNvPr id="2" name="幻灯片图像占位符 1"/>
+          <p:cNvSpPr/>
+          <p:nvPr>
+            <p:ph type="sldImg" idx="2"/>
+          </p:nvPr>
+        </p:nvSpPr>
+        <p:spPr/>
+      </p:sp>
+      <p:sp>
+        <p:nvSpPr>
+          <p:cNvPr id="3" name="文本占位符 2"/>
+          <p:cNvSpPr/>
+          <p:nvPr>
+            <p:ph type="body" idx="3"/>
+          </p:nvPr>
+        </p:nvSpPr>
+        <p:spPr/>
+        <p:txBody>
+          <a:bodyPr/>
+          <a:p>
+            <a:endParaRPr lang="zh-CN" altLang="en-US"/>
+          </a:p>
+        </p:txBody>
+      </p:sp>
+      <p:sp>
+        <p:nvSpPr>
+          <p:cNvPr id="4" name="灯片编号占位符 3"/>
+          <p:cNvSpPr>
+            <a:spLocks noGrp="1"/>
+          </p:cNvSpPr>
+          <p:nvPr>
+            <p:ph type="sldNum" sz="quarter" idx="5"/>
+          </p:nvPr>
+        </p:nvSpPr>
+        <p:spPr/>
+        <p:txBody>
+          <a:bodyPr/>
+          <a:p>
+            <a:fld id="{8B977A81-A92E-49D7-A0D9-5EAE52519BB4}" type="slidenum">
+              <a:rPr lang="zh-CN" altLang="en-US" smtClean="0"/>
+            </a:fld>
+            <a:endParaRPr lang="zh-CN" altLang="en-US"/>
+          </a:p>
+        </p:txBody>
+      </p:sp>
+    </p:spTree>
+  </p:cSld>
+  <p:clrMapOvr>
+    <a:masterClrMapping/>
+  </p:clrMapOvr>
+</p:notes>
 </file>
 
 <file path=ppt/slideLayouts/slideLayout1.xml><?xml version="1.0" encoding="utf-8"?>
@@ -3028,6 +3131,3153 @@
     </p:otherStyle>
   </p:txStyles>
 </p:sldMaster>
+</file>
+
+<file path=ppt/slides/slide1.xml><?xml version="1.0" encoding="utf-8"?>
+<p:sld xmlns:a="http://schemas.openxmlformats.org/drawingml/2006/main" xmlns:r="http://schemas.openxmlformats.org/officeDocument/2006/relationships" xmlns:p="http://schemas.openxmlformats.org/presentationml/2006/main">
+  <p:cSld>
+    <p:spTree>
+      <p:nvGrpSpPr>
+        <p:cNvPr id="1" name=""/>
+        <p:cNvGrpSpPr/>
+        <p:nvPr/>
+      </p:nvGrpSpPr>
+      <p:grpSpPr/>
+      <p:sp>
+        <p:nvSpPr>
+          <p:cNvPr id="2" name="标题 1"/>
+          <p:cNvSpPr>
+            <a:spLocks noGrp="1"/>
+          </p:cNvSpPr>
+          <p:nvPr>
+            <p:ph type="ctrTitle"/>
+          </p:nvPr>
+        </p:nvSpPr>
+        <p:spPr/>
+        <p:txBody>
+          <a:bodyPr>
+            <a:normAutofit fontScale="90000"/>
+          </a:bodyPr>
+          <a:p>
+            <a:r>
+              <a:rPr lang="zh-CN" altLang="en-US">
+                <a:sym typeface="+mn-ea"/>
+              </a:rPr>
+              <a:t>安同开源社区</a:t>
+            </a:r>
+            <a:r>
+              <a:rPr lang="en-US" altLang="zh-CN">
+                <a:sym typeface="+mn-ea"/>
+              </a:rPr>
+              <a:t> 2023 </a:t>
+            </a:r>
+            <a:r>
+              <a:rPr lang="zh-CN" altLang="en-US">
+                <a:sym typeface="+mn-ea"/>
+              </a:rPr>
+              <a:t>年度工作报告</a:t>
+            </a:r>
+            <a:endParaRPr lang="zh-CN" altLang="en-US"/>
+          </a:p>
+        </p:txBody>
+      </p:sp>
+      <p:sp>
+        <p:nvSpPr>
+          <p:cNvPr id="3" name="副标题 2"/>
+          <p:cNvSpPr>
+            <a:spLocks noGrp="1"/>
+          </p:cNvSpPr>
+          <p:nvPr>
+            <p:ph type="subTitle" idx="1"/>
+          </p:nvPr>
+        </p:nvSpPr>
+        <p:spPr/>
+        <p:txBody>
+          <a:bodyPr>
+            <a:normAutofit fontScale="90000" lnSpcReduction="20000"/>
+          </a:bodyPr>
+          <a:p>
+            <a:r>
+              <a:rPr lang="zh-CN" altLang="en-US"/>
+              <a:t>众人拾柴火焰高</a:t>
+            </a:r>
+            <a:endParaRPr lang="zh-CN" altLang="en-US"/>
+          </a:p>
+        </p:txBody>
+      </p:sp>
+      <p:sp>
+        <p:nvSpPr>
+          <p:cNvPr id="4" name="文本占位符 3"/>
+          <p:cNvSpPr>
+            <a:spLocks noGrp="1"/>
+          </p:cNvSpPr>
+          <p:nvPr>
+            <p:ph type="body" sz="quarter" idx="13"/>
+          </p:nvPr>
+        </p:nvSpPr>
+        <p:spPr/>
+        <p:txBody>
+          <a:bodyPr/>
+          <a:p>
+            <a:r>
+              <a:rPr lang="zh-CN" altLang="en-US"/>
+              <a:t>疾钀驚</a:t>
+            </a:r>
+            <a:endParaRPr lang="zh-CN" altLang="en-US"/>
+          </a:p>
+        </p:txBody>
+      </p:sp>
+      <p:sp>
+        <p:nvSpPr>
+          <p:cNvPr id="5" name="文本占位符 4"/>
+          <p:cNvSpPr>
+            <a:spLocks noGrp="1"/>
+          </p:cNvSpPr>
+          <p:nvPr>
+            <p:ph type="body" sz="quarter" idx="14"/>
+          </p:nvPr>
+        </p:nvSpPr>
+        <p:spPr/>
+        <p:txBody>
+          <a:bodyPr>
+            <a:normAutofit lnSpcReduction="10000"/>
+          </a:bodyPr>
+          <a:p>
+            <a:endParaRPr lang="zh-CN" altLang="en-US"/>
+          </a:p>
+        </p:txBody>
+      </p:sp>
+    </p:spTree>
+  </p:cSld>
+  <p:clrMapOvr>
+    <a:masterClrMapping/>
+  </p:clrMapOvr>
+</p:sld>
+</file>
+
+<file path=ppt/slides/slide10.xml><?xml version="1.0" encoding="utf-8"?>
+<p:sld xmlns:a="http://schemas.openxmlformats.org/drawingml/2006/main" xmlns:r="http://schemas.openxmlformats.org/officeDocument/2006/relationships" xmlns:p="http://schemas.openxmlformats.org/presentationml/2006/main">
+  <p:cSld>
+    <p:spTree>
+      <p:nvGrpSpPr>
+        <p:cNvPr id="1" name=""/>
+        <p:cNvGrpSpPr/>
+        <p:nvPr/>
+      </p:nvGrpSpPr>
+      <p:grpSpPr/>
+      <p:sp>
+        <p:nvSpPr>
+          <p:cNvPr id="2" name="标题 1"/>
+          <p:cNvSpPr>
+            <a:spLocks noGrp="1"/>
+          </p:cNvSpPr>
+          <p:nvPr>
+            <p:ph type="title"/>
+          </p:nvPr>
+        </p:nvSpPr>
+        <p:spPr/>
+        <p:txBody>
+          <a:bodyPr>
+            <a:normAutofit fontScale="90000"/>
+          </a:bodyPr>
+          <a:p>
+            <a:r>
+              <a:rPr lang="zh-CN" altLang="en-US"/>
+              <a:t>摘要：社区文化工作</a:t>
+            </a:r>
+            <a:endParaRPr altLang="zh-CN"/>
+          </a:p>
+        </p:txBody>
+      </p:sp>
+      <p:sp>
+        <p:nvSpPr>
+          <p:cNvPr id="3" name="内容占位符 2"/>
+          <p:cNvSpPr>
+            <a:spLocks noGrp="1"/>
+          </p:cNvSpPr>
+          <p:nvPr>
+            <p:ph idx="1"/>
+          </p:nvPr>
+        </p:nvSpPr>
+        <p:spPr/>
+        <p:txBody>
+          <a:bodyPr/>
+          <a:p>
+            <a:endParaRPr lang="zh-CN" altLang="en-US"/>
+          </a:p>
+        </p:txBody>
+      </p:sp>
+    </p:spTree>
+  </p:cSld>
+  <p:clrMapOvr>
+    <a:masterClrMapping/>
+  </p:clrMapOvr>
+</p:sld>
+</file>
+
+<file path=ppt/slides/slide11.xml><?xml version="1.0" encoding="utf-8"?>
+<p:sld xmlns:a="http://schemas.openxmlformats.org/drawingml/2006/main" xmlns:r="http://schemas.openxmlformats.org/officeDocument/2006/relationships" xmlns:p="http://schemas.openxmlformats.org/presentationml/2006/main">
+  <p:cSld>
+    <p:spTree>
+      <p:nvGrpSpPr>
+        <p:cNvPr id="1" name=""/>
+        <p:cNvGrpSpPr/>
+        <p:nvPr/>
+      </p:nvGrpSpPr>
+      <p:grpSpPr/>
+      <p:sp>
+        <p:nvSpPr>
+          <p:cNvPr id="2" name="标题 1"/>
+          <p:cNvSpPr>
+            <a:spLocks noGrp="1"/>
+          </p:cNvSpPr>
+          <p:nvPr>
+            <p:ph type="title"/>
+          </p:nvPr>
+        </p:nvSpPr>
+        <p:spPr/>
+        <p:txBody>
+          <a:bodyPr>
+            <a:normAutofit fontScale="90000"/>
+          </a:bodyPr>
+          <a:p>
+            <a:r>
+              <a:rPr lang="zh-CN" altLang="en-US"/>
+              <a:t>生产力解放：维护自动化</a:t>
+            </a:r>
+            <a:endParaRPr lang="zh-CN" altLang="en-US"/>
+          </a:p>
+        </p:txBody>
+      </p:sp>
+      <p:sp>
+        <p:nvSpPr>
+          <p:cNvPr id="3" name="内容占位符 2"/>
+          <p:cNvSpPr>
+            <a:spLocks noGrp="1"/>
+          </p:cNvSpPr>
+          <p:nvPr>
+            <p:ph idx="1"/>
+          </p:nvPr>
+        </p:nvSpPr>
+        <p:spPr/>
+        <p:txBody>
+          <a:bodyPr/>
+          <a:p>
+            <a:endParaRPr lang="zh-CN" altLang="en-US"/>
+          </a:p>
+        </p:txBody>
+      </p:sp>
+    </p:spTree>
+  </p:cSld>
+  <p:clrMapOvr>
+    <a:masterClrMapping/>
+  </p:clrMapOvr>
+</p:sld>
+</file>
+
+<file path=ppt/slides/slide12.xml><?xml version="1.0" encoding="utf-8"?>
+<p:sld xmlns:a="http://schemas.openxmlformats.org/drawingml/2006/main" xmlns:r="http://schemas.openxmlformats.org/officeDocument/2006/relationships" xmlns:p="http://schemas.openxmlformats.org/presentationml/2006/main">
+  <p:cSld>
+    <p:spTree>
+      <p:nvGrpSpPr>
+        <p:cNvPr id="1" name=""/>
+        <p:cNvGrpSpPr/>
+        <p:nvPr/>
+      </p:nvGrpSpPr>
+      <p:grpSpPr/>
+      <p:sp>
+        <p:nvSpPr>
+          <p:cNvPr id="2" name="标题 1"/>
+          <p:cNvSpPr>
+            <a:spLocks noGrp="1"/>
+          </p:cNvSpPr>
+          <p:nvPr>
+            <p:ph type="title"/>
+          </p:nvPr>
+        </p:nvSpPr>
+        <p:spPr/>
+        <p:txBody>
+          <a:bodyPr>
+            <a:normAutofit fontScale="90000"/>
+          </a:bodyPr>
+          <a:p>
+            <a:r>
+              <a:rPr altLang="zh-CN"/>
+              <a:t>BuildIt!</a:t>
+            </a:r>
+            <a:endParaRPr altLang="zh-CN"/>
+          </a:p>
+        </p:txBody>
+      </p:sp>
+      <p:sp>
+        <p:nvSpPr>
+          <p:cNvPr id="3" name="内容占位符 2"/>
+          <p:cNvSpPr>
+            <a:spLocks noGrp="1"/>
+          </p:cNvSpPr>
+          <p:nvPr>
+            <p:ph idx="1"/>
+          </p:nvPr>
+        </p:nvSpPr>
+        <p:spPr/>
+        <p:txBody>
+          <a:bodyPr/>
+          <a:p>
+            <a:endParaRPr lang="zh-CN" altLang="en-US"/>
+          </a:p>
+        </p:txBody>
+      </p:sp>
+    </p:spTree>
+  </p:cSld>
+  <p:clrMapOvr>
+    <a:masterClrMapping/>
+  </p:clrMapOvr>
+</p:sld>
+</file>
+
+<file path=ppt/slides/slide13.xml><?xml version="1.0" encoding="utf-8"?>
+<p:sld xmlns:a="http://schemas.openxmlformats.org/drawingml/2006/main" xmlns:r="http://schemas.openxmlformats.org/officeDocument/2006/relationships" xmlns:p="http://schemas.openxmlformats.org/presentationml/2006/main">
+  <p:cSld>
+    <p:spTree>
+      <p:nvGrpSpPr>
+        <p:cNvPr id="1" name=""/>
+        <p:cNvGrpSpPr/>
+        <p:nvPr/>
+      </p:nvGrpSpPr>
+      <p:grpSpPr/>
+      <p:sp>
+        <p:nvSpPr>
+          <p:cNvPr id="2" name="标题 1"/>
+          <p:cNvSpPr>
+            <a:spLocks noGrp="1"/>
+          </p:cNvSpPr>
+          <p:nvPr>
+            <p:ph type="title"/>
+          </p:nvPr>
+        </p:nvSpPr>
+        <p:spPr/>
+        <p:txBody>
+          <a:bodyPr>
+            <a:normAutofit fontScale="90000"/>
+          </a:bodyPr>
+          <a:p>
+            <a:r>
+              <a:rPr altLang="zh-CN"/>
+              <a:t>Autobuild4 </a:t>
+            </a:r>
+            <a:r>
+              <a:rPr lang="zh-CN" altLang="en-US"/>
+              <a:t>与</a:t>
+            </a:r>
+            <a:r>
+              <a:rPr altLang="zh-CN"/>
+              <a:t> Dickens</a:t>
+            </a:r>
+            <a:endParaRPr altLang="zh-CN"/>
+          </a:p>
+        </p:txBody>
+      </p:sp>
+      <p:sp>
+        <p:nvSpPr>
+          <p:cNvPr id="3" name="内容占位符 2"/>
+          <p:cNvSpPr>
+            <a:spLocks noGrp="1"/>
+          </p:cNvSpPr>
+          <p:nvPr>
+            <p:ph idx="1"/>
+          </p:nvPr>
+        </p:nvSpPr>
+        <p:spPr/>
+        <p:txBody>
+          <a:bodyPr/>
+          <a:p>
+            <a:endParaRPr lang="zh-CN" altLang="en-US"/>
+          </a:p>
+        </p:txBody>
+      </p:sp>
+    </p:spTree>
+  </p:cSld>
+  <p:clrMapOvr>
+    <a:masterClrMapping/>
+  </p:clrMapOvr>
+</p:sld>
+</file>
+
+<file path=ppt/slides/slide14.xml><?xml version="1.0" encoding="utf-8"?>
+<p:sld xmlns:a="http://schemas.openxmlformats.org/drawingml/2006/main" xmlns:r="http://schemas.openxmlformats.org/officeDocument/2006/relationships" xmlns:p="http://schemas.openxmlformats.org/presentationml/2006/main">
+  <p:cSld>
+    <p:spTree>
+      <p:nvGrpSpPr>
+        <p:cNvPr id="1" name=""/>
+        <p:cNvGrpSpPr/>
+        <p:nvPr/>
+      </p:nvGrpSpPr>
+      <p:grpSpPr/>
+      <p:sp>
+        <p:nvSpPr>
+          <p:cNvPr id="2" name="标题 1"/>
+          <p:cNvSpPr>
+            <a:spLocks noGrp="1"/>
+          </p:cNvSpPr>
+          <p:nvPr>
+            <p:ph type="title"/>
+          </p:nvPr>
+        </p:nvSpPr>
+        <p:spPr/>
+        <p:txBody>
+          <a:bodyPr>
+            <a:normAutofit fontScale="90000"/>
+          </a:bodyPr>
+          <a:p>
+            <a:r>
+              <a:rPr altLang="zh-CN"/>
+              <a:t>BuildIt! </a:t>
+            </a:r>
+            <a:r>
+              <a:rPr lang="zh-CN" altLang="en-US"/>
+              <a:t>周边与</a:t>
+            </a:r>
+            <a:r>
+              <a:rPr altLang="zh-CN"/>
+              <a:t> It! </a:t>
+            </a:r>
+            <a:r>
+              <a:rPr lang="zh-CN" altLang="en-US"/>
+              <a:t>家族项目</a:t>
+            </a:r>
+            <a:endParaRPr lang="zh-CN" altLang="en-US"/>
+          </a:p>
+        </p:txBody>
+      </p:sp>
+      <p:sp>
+        <p:nvSpPr>
+          <p:cNvPr id="3" name="内容占位符 2"/>
+          <p:cNvSpPr>
+            <a:spLocks noGrp="1"/>
+          </p:cNvSpPr>
+          <p:nvPr>
+            <p:ph idx="1"/>
+          </p:nvPr>
+        </p:nvSpPr>
+        <p:spPr/>
+        <p:txBody>
+          <a:bodyPr/>
+          <a:p>
+            <a:endParaRPr lang="zh-CN" altLang="en-US"/>
+          </a:p>
+        </p:txBody>
+      </p:sp>
+    </p:spTree>
+  </p:cSld>
+  <p:clrMapOvr>
+    <a:masterClrMapping/>
+  </p:clrMapOvr>
+</p:sld>
+</file>
+
+<file path=ppt/slides/slide15.xml><?xml version="1.0" encoding="utf-8"?>
+<p:sld xmlns:a="http://schemas.openxmlformats.org/drawingml/2006/main" xmlns:r="http://schemas.openxmlformats.org/officeDocument/2006/relationships" xmlns:p="http://schemas.openxmlformats.org/presentationml/2006/main">
+  <p:cSld>
+    <p:spTree>
+      <p:nvGrpSpPr>
+        <p:cNvPr id="1" name=""/>
+        <p:cNvGrpSpPr/>
+        <p:nvPr/>
+      </p:nvGrpSpPr>
+      <p:grpSpPr/>
+      <p:sp>
+        <p:nvSpPr>
+          <p:cNvPr id="2" name="标题 1"/>
+          <p:cNvSpPr>
+            <a:spLocks noGrp="1"/>
+          </p:cNvSpPr>
+          <p:nvPr>
+            <p:ph type="title"/>
+          </p:nvPr>
+        </p:nvSpPr>
+        <p:spPr/>
+        <p:txBody>
+          <a:bodyPr>
+            <a:normAutofit fontScale="90000"/>
+          </a:bodyPr>
+          <a:p>
+            <a:r>
+              <a:rPr lang="zh-CN" altLang="en-US"/>
+              <a:t>亦师亦友：用户社区初具规模</a:t>
+            </a:r>
+            <a:endParaRPr lang="zh-CN" altLang="en-US"/>
+          </a:p>
+        </p:txBody>
+      </p:sp>
+      <p:sp>
+        <p:nvSpPr>
+          <p:cNvPr id="3" name="内容占位符 2"/>
+          <p:cNvSpPr>
+            <a:spLocks noGrp="1"/>
+          </p:cNvSpPr>
+          <p:nvPr>
+            <p:ph idx="1"/>
+          </p:nvPr>
+        </p:nvSpPr>
+        <p:spPr/>
+        <p:txBody>
+          <a:bodyPr/>
+          <a:p>
+            <a:endParaRPr lang="zh-CN" altLang="en-US"/>
+          </a:p>
+        </p:txBody>
+      </p:sp>
+    </p:spTree>
+  </p:cSld>
+  <p:clrMapOvr>
+    <a:masterClrMapping/>
+  </p:clrMapOvr>
+</p:sld>
+</file>
+
+<file path=ppt/slides/slide16.xml><?xml version="1.0" encoding="utf-8"?>
+<p:sld xmlns:a="http://schemas.openxmlformats.org/drawingml/2006/main" xmlns:r="http://schemas.openxmlformats.org/officeDocument/2006/relationships" xmlns:p="http://schemas.openxmlformats.org/presentationml/2006/main">
+  <p:cSld>
+    <p:spTree>
+      <p:nvGrpSpPr>
+        <p:cNvPr id="1" name=""/>
+        <p:cNvGrpSpPr/>
+        <p:nvPr/>
+      </p:nvGrpSpPr>
+      <p:grpSpPr/>
+      <p:sp>
+        <p:nvSpPr>
+          <p:cNvPr id="2" name="标题 1"/>
+          <p:cNvSpPr>
+            <a:spLocks noGrp="1"/>
+          </p:cNvSpPr>
+          <p:nvPr>
+            <p:ph type="title"/>
+          </p:nvPr>
+        </p:nvSpPr>
+        <p:spPr/>
+        <p:txBody>
+          <a:bodyPr>
+            <a:normAutofit fontScale="90000"/>
+          </a:bodyPr>
+          <a:p>
+            <a:r>
+              <a:rPr lang="zh-CN" altLang="en-US"/>
+              <a:t>在龙架构实现个人桌面生产力</a:t>
+            </a:r>
+            <a:endParaRPr lang="zh-CN" altLang="en-US"/>
+          </a:p>
+        </p:txBody>
+      </p:sp>
+      <p:sp>
+        <p:nvSpPr>
+          <p:cNvPr id="3" name="内容占位符 2"/>
+          <p:cNvSpPr>
+            <a:spLocks noGrp="1"/>
+          </p:cNvSpPr>
+          <p:nvPr>
+            <p:ph idx="1"/>
+          </p:nvPr>
+        </p:nvSpPr>
+        <p:spPr/>
+        <p:txBody>
+          <a:bodyPr/>
+          <a:p>
+            <a:endParaRPr lang="zh-CN" altLang="en-US"/>
+          </a:p>
+        </p:txBody>
+      </p:sp>
+    </p:spTree>
+  </p:cSld>
+  <p:clrMapOvr>
+    <a:masterClrMapping/>
+  </p:clrMapOvr>
+</p:sld>
+</file>
+
+<file path=ppt/slides/slide17.xml><?xml version="1.0" encoding="utf-8"?>
+<p:sld xmlns:a="http://schemas.openxmlformats.org/drawingml/2006/main" xmlns:r="http://schemas.openxmlformats.org/officeDocument/2006/relationships" xmlns:p="http://schemas.openxmlformats.org/presentationml/2006/main">
+  <p:cSld>
+    <p:spTree>
+      <p:nvGrpSpPr>
+        <p:cNvPr id="1" name=""/>
+        <p:cNvGrpSpPr/>
+        <p:nvPr/>
+      </p:nvGrpSpPr>
+      <p:grpSpPr/>
+      <p:sp>
+        <p:nvSpPr>
+          <p:cNvPr id="2" name="标题 1"/>
+          <p:cNvSpPr>
+            <a:spLocks noGrp="1"/>
+          </p:cNvSpPr>
+          <p:nvPr>
+            <p:ph type="title"/>
+          </p:nvPr>
+        </p:nvSpPr>
+        <p:spPr/>
+        <p:txBody>
+          <a:bodyPr>
+            <a:normAutofit fontScale="90000"/>
+          </a:bodyPr>
+          <a:p>
+            <a:r>
+              <a:rPr lang="zh-CN" altLang="en-US"/>
+              <a:t>规模化用户支持的尝试</a:t>
+            </a:r>
+            <a:endParaRPr lang="zh-CN" altLang="en-US"/>
+          </a:p>
+        </p:txBody>
+      </p:sp>
+      <p:sp>
+        <p:nvSpPr>
+          <p:cNvPr id="3" name="内容占位符 2"/>
+          <p:cNvSpPr>
+            <a:spLocks noGrp="1"/>
+          </p:cNvSpPr>
+          <p:nvPr>
+            <p:ph idx="1"/>
+          </p:nvPr>
+        </p:nvSpPr>
+        <p:spPr/>
+        <p:txBody>
+          <a:bodyPr/>
+          <a:p>
+            <a:endParaRPr lang="zh-CN" altLang="en-US"/>
+          </a:p>
+        </p:txBody>
+      </p:sp>
+    </p:spTree>
+  </p:cSld>
+  <p:clrMapOvr>
+    <a:masterClrMapping/>
+  </p:clrMapOvr>
+</p:sld>
+</file>
+
+<file path=ppt/slides/slide18.xml><?xml version="1.0" encoding="utf-8"?>
+<p:sld xmlns:a="http://schemas.openxmlformats.org/drawingml/2006/main" xmlns:r="http://schemas.openxmlformats.org/officeDocument/2006/relationships" xmlns:p="http://schemas.openxmlformats.org/presentationml/2006/main">
+  <p:cSld>
+    <p:spTree>
+      <p:nvGrpSpPr>
+        <p:cNvPr id="1" name=""/>
+        <p:cNvGrpSpPr/>
+        <p:nvPr/>
+      </p:nvGrpSpPr>
+      <p:grpSpPr/>
+      <p:sp>
+        <p:nvSpPr>
+          <p:cNvPr id="2" name="标题 1"/>
+          <p:cNvSpPr>
+            <a:spLocks noGrp="1"/>
+          </p:cNvSpPr>
+          <p:nvPr>
+            <p:ph type="title"/>
+          </p:nvPr>
+        </p:nvSpPr>
+        <p:spPr/>
+        <p:txBody>
+          <a:bodyPr>
+            <a:normAutofit fontScale="90000"/>
+          </a:bodyPr>
+          <a:p>
+            <a:r>
+              <a:rPr lang="zh-CN" altLang="en-US"/>
+              <a:t>嘴炮无用：践行用户友好承诺</a:t>
+            </a:r>
+            <a:endParaRPr lang="zh-CN" altLang="en-US"/>
+          </a:p>
+        </p:txBody>
+      </p:sp>
+      <p:sp>
+        <p:nvSpPr>
+          <p:cNvPr id="3" name="内容占位符 2"/>
+          <p:cNvSpPr>
+            <a:spLocks noGrp="1"/>
+          </p:cNvSpPr>
+          <p:nvPr>
+            <p:ph idx="1"/>
+          </p:nvPr>
+        </p:nvSpPr>
+        <p:spPr/>
+        <p:txBody>
+          <a:bodyPr/>
+          <a:p>
+            <a:endParaRPr lang="zh-CN" altLang="en-US"/>
+          </a:p>
+        </p:txBody>
+      </p:sp>
+    </p:spTree>
+  </p:cSld>
+  <p:clrMapOvr>
+    <a:masterClrMapping/>
+  </p:clrMapOvr>
+</p:sld>
+</file>
+
+<file path=ppt/slides/slide19.xml><?xml version="1.0" encoding="utf-8"?>
+<p:sld xmlns:a="http://schemas.openxmlformats.org/drawingml/2006/main" xmlns:r="http://schemas.openxmlformats.org/officeDocument/2006/relationships" xmlns:p="http://schemas.openxmlformats.org/presentationml/2006/main">
+  <p:cSld>
+    <p:spTree>
+      <p:nvGrpSpPr>
+        <p:cNvPr id="1" name=""/>
+        <p:cNvGrpSpPr/>
+        <p:nvPr/>
+      </p:nvGrpSpPr>
+      <p:grpSpPr/>
+      <p:sp>
+        <p:nvSpPr>
+          <p:cNvPr id="2" name="标题 1"/>
+          <p:cNvSpPr>
+            <a:spLocks noGrp="1"/>
+          </p:cNvSpPr>
+          <p:nvPr>
+            <p:ph type="title"/>
+          </p:nvPr>
+        </p:nvSpPr>
+        <p:spPr/>
+        <p:txBody>
+          <a:bodyPr>
+            <a:normAutofit fontScale="90000"/>
+          </a:bodyPr>
+          <a:p>
+            <a:r>
+              <a:rPr altLang="zh-CN"/>
+              <a:t>libLoL </a:t>
+            </a:r>
+            <a:r>
+              <a:rPr lang="zh-CN" altLang="en-US"/>
+              <a:t>打破世界线壁垒</a:t>
+            </a:r>
+            <a:endParaRPr lang="zh-CN" altLang="en-US"/>
+          </a:p>
+        </p:txBody>
+      </p:sp>
+      <p:sp>
+        <p:nvSpPr>
+          <p:cNvPr id="3" name="内容占位符 2"/>
+          <p:cNvSpPr>
+            <a:spLocks noGrp="1"/>
+          </p:cNvSpPr>
+          <p:nvPr>
+            <p:ph idx="1"/>
+          </p:nvPr>
+        </p:nvSpPr>
+        <p:spPr/>
+        <p:txBody>
+          <a:bodyPr/>
+          <a:p>
+            <a:endParaRPr lang="zh-CN" altLang="en-US"/>
+          </a:p>
+        </p:txBody>
+      </p:sp>
+    </p:spTree>
+  </p:cSld>
+  <p:clrMapOvr>
+    <a:masterClrMapping/>
+  </p:clrMapOvr>
+</p:sld>
+</file>
+
+<file path=ppt/slides/slide2.xml><?xml version="1.0" encoding="utf-8"?>
+<p:sld xmlns:a="http://schemas.openxmlformats.org/drawingml/2006/main" xmlns:r="http://schemas.openxmlformats.org/officeDocument/2006/relationships" xmlns:p="http://schemas.openxmlformats.org/presentationml/2006/main">
+  <p:cSld>
+    <p:spTree>
+      <p:nvGrpSpPr>
+        <p:cNvPr id="1" name=""/>
+        <p:cNvGrpSpPr/>
+        <p:nvPr/>
+      </p:nvGrpSpPr>
+      <p:grpSpPr/>
+      <p:sp>
+        <p:nvSpPr>
+          <p:cNvPr id="2" name="标题 1"/>
+          <p:cNvSpPr>
+            <a:spLocks noGrp="1"/>
+          </p:cNvSpPr>
+          <p:nvPr>
+            <p:ph type="ctrTitle"/>
+          </p:nvPr>
+        </p:nvSpPr>
+        <p:spPr/>
+        <p:txBody>
+          <a:bodyPr>
+            <a:normAutofit fontScale="90000"/>
+          </a:bodyPr>
+          <a:p>
+            <a:r>
+              <a:rPr lang="zh-CN" altLang="en-US">
+                <a:sym typeface="+mn-ea"/>
+              </a:rPr>
+              <a:t>安同开源社区</a:t>
+            </a:r>
+            <a:r>
+              <a:rPr lang="en-US" altLang="zh-CN">
+                <a:sym typeface="+mn-ea"/>
+              </a:rPr>
+              <a:t> 2023 </a:t>
+            </a:r>
+            <a:r>
+              <a:rPr lang="zh-CN" altLang="en-US">
+                <a:sym typeface="+mn-ea"/>
+              </a:rPr>
+              <a:t>年度工作报告</a:t>
+            </a:r>
+            <a:endParaRPr lang="zh-CN" altLang="en-US"/>
+          </a:p>
+        </p:txBody>
+      </p:sp>
+      <p:sp>
+        <p:nvSpPr>
+          <p:cNvPr id="3" name="副标题 2"/>
+          <p:cNvSpPr>
+            <a:spLocks noGrp="1"/>
+          </p:cNvSpPr>
+          <p:nvPr>
+            <p:ph type="subTitle" idx="1"/>
+          </p:nvPr>
+        </p:nvSpPr>
+        <p:spPr/>
+        <p:txBody>
+          <a:bodyPr>
+            <a:normAutofit fontScale="90000" lnSpcReduction="20000"/>
+          </a:bodyPr>
+          <a:p>
+            <a:r>
+              <a:rPr lang="zh-CN" altLang="en-US"/>
+              <a:t>众人拾柴火焰高</a:t>
+            </a:r>
+            <a:endParaRPr lang="zh-CN" altLang="en-US"/>
+          </a:p>
+        </p:txBody>
+      </p:sp>
+      <p:sp>
+        <p:nvSpPr>
+          <p:cNvPr id="4" name="文本占位符 3"/>
+          <p:cNvSpPr>
+            <a:spLocks noGrp="1"/>
+          </p:cNvSpPr>
+          <p:nvPr>
+            <p:ph type="body" sz="quarter" idx="13"/>
+          </p:nvPr>
+        </p:nvSpPr>
+        <p:spPr/>
+        <p:txBody>
+          <a:bodyPr/>
+          <a:p>
+            <a:r>
+              <a:rPr lang="zh-CN" altLang="en-US"/>
+              <a:t>白铭骢</a:t>
+            </a:r>
+            <a:endParaRPr lang="zh-CN" altLang="en-US"/>
+          </a:p>
+        </p:txBody>
+      </p:sp>
+      <p:sp>
+        <p:nvSpPr>
+          <p:cNvPr id="5" name="文本占位符 4"/>
+          <p:cNvSpPr>
+            <a:spLocks noGrp="1"/>
+          </p:cNvSpPr>
+          <p:nvPr>
+            <p:ph type="body" sz="quarter" idx="14"/>
+          </p:nvPr>
+        </p:nvSpPr>
+        <p:spPr/>
+        <p:txBody>
+          <a:bodyPr>
+            <a:normAutofit lnSpcReduction="10000"/>
+          </a:bodyPr>
+          <a:p>
+            <a:endParaRPr lang="zh-CN" altLang="en-US"/>
+          </a:p>
+        </p:txBody>
+      </p:sp>
+    </p:spTree>
+  </p:cSld>
+  <p:clrMapOvr>
+    <a:masterClrMapping/>
+  </p:clrMapOvr>
+</p:sld>
+</file>
+
+<file path=ppt/slides/slide20.xml><?xml version="1.0" encoding="utf-8"?>
+<p:sld xmlns:a="http://schemas.openxmlformats.org/drawingml/2006/main" xmlns:r="http://schemas.openxmlformats.org/officeDocument/2006/relationships" xmlns:p="http://schemas.openxmlformats.org/presentationml/2006/main">
+  <p:cSld>
+    <p:spTree>
+      <p:nvGrpSpPr>
+        <p:cNvPr id="1" name=""/>
+        <p:cNvGrpSpPr/>
+        <p:nvPr/>
+      </p:nvGrpSpPr>
+      <p:grpSpPr/>
+      <p:sp>
+        <p:nvSpPr>
+          <p:cNvPr id="2" name="标题 1"/>
+          <p:cNvSpPr>
+            <a:spLocks noGrp="1"/>
+          </p:cNvSpPr>
+          <p:nvPr>
+            <p:ph type="title"/>
+          </p:nvPr>
+        </p:nvSpPr>
+        <p:spPr/>
+        <p:txBody>
+          <a:bodyPr>
+            <a:normAutofit fontScale="90000"/>
+          </a:bodyPr>
+          <a:p>
+            <a:r>
+              <a:rPr altLang="zh-CN"/>
+              <a:t>oma </a:t>
+            </a:r>
+            <a:r>
+              <a:rPr lang="zh-CN" altLang="en-US"/>
+              <a:t>小熊猫包管理</a:t>
+            </a:r>
+            <a:endParaRPr lang="zh-CN" altLang="en-US"/>
+          </a:p>
+        </p:txBody>
+      </p:sp>
+      <p:sp>
+        <p:nvSpPr>
+          <p:cNvPr id="3" name="内容占位符 2"/>
+          <p:cNvSpPr>
+            <a:spLocks noGrp="1"/>
+          </p:cNvSpPr>
+          <p:nvPr>
+            <p:ph idx="1"/>
+          </p:nvPr>
+        </p:nvSpPr>
+        <p:spPr/>
+        <p:txBody>
+          <a:bodyPr/>
+          <a:p>
+            <a:endParaRPr lang="zh-CN" altLang="en-US"/>
+          </a:p>
+        </p:txBody>
+      </p:sp>
+    </p:spTree>
+  </p:cSld>
+  <p:clrMapOvr>
+    <a:masterClrMapping/>
+  </p:clrMapOvr>
+</p:sld>
+</file>
+
+<file path=ppt/slides/slide21.xml><?xml version="1.0" encoding="utf-8"?>
+<p:sld xmlns:a="http://schemas.openxmlformats.org/drawingml/2006/main" xmlns:r="http://schemas.openxmlformats.org/officeDocument/2006/relationships" xmlns:p="http://schemas.openxmlformats.org/presentationml/2006/main">
+  <p:cSld>
+    <p:spTree>
+      <p:nvGrpSpPr>
+        <p:cNvPr id="1" name=""/>
+        <p:cNvGrpSpPr/>
+        <p:nvPr/>
+      </p:nvGrpSpPr>
+      <p:grpSpPr/>
+      <p:sp>
+        <p:nvSpPr>
+          <p:cNvPr id="2" name="标题 1"/>
+          <p:cNvSpPr>
+            <a:spLocks noGrp="1"/>
+          </p:cNvSpPr>
+          <p:nvPr>
+            <p:ph type="title"/>
+          </p:nvPr>
+        </p:nvSpPr>
+        <p:spPr/>
+        <p:txBody>
+          <a:bodyPr>
+            <a:normAutofit fontScale="90000"/>
+          </a:bodyPr>
+          <a:p>
+            <a:r>
+              <a:rPr lang="zh-CN" altLang="en-US"/>
+              <a:t>图形化安装程序与维护环境</a:t>
+            </a:r>
+            <a:endParaRPr lang="zh-CN" altLang="en-US"/>
+          </a:p>
+        </p:txBody>
+      </p:sp>
+      <p:sp>
+        <p:nvSpPr>
+          <p:cNvPr id="3" name="内容占位符 2"/>
+          <p:cNvSpPr>
+            <a:spLocks noGrp="1"/>
+          </p:cNvSpPr>
+          <p:nvPr>
+            <p:ph idx="1"/>
+          </p:nvPr>
+        </p:nvSpPr>
+        <p:spPr/>
+        <p:txBody>
+          <a:bodyPr/>
+          <a:p>
+            <a:endParaRPr lang="zh-CN" altLang="en-US"/>
+          </a:p>
+        </p:txBody>
+      </p:sp>
+    </p:spTree>
+  </p:cSld>
+  <p:clrMapOvr>
+    <a:masterClrMapping/>
+  </p:clrMapOvr>
+</p:sld>
+</file>
+
+<file path=ppt/slides/slide22.xml><?xml version="1.0" encoding="utf-8"?>
+<p:sld xmlns:a="http://schemas.openxmlformats.org/drawingml/2006/main" xmlns:r="http://schemas.openxmlformats.org/officeDocument/2006/relationships" xmlns:p="http://schemas.openxmlformats.org/presentationml/2006/main">
+  <p:cSld>
+    <p:spTree>
+      <p:nvGrpSpPr>
+        <p:cNvPr id="1" name=""/>
+        <p:cNvGrpSpPr/>
+        <p:nvPr/>
+      </p:nvGrpSpPr>
+      <p:grpSpPr/>
+      <p:sp>
+        <p:nvSpPr>
+          <p:cNvPr id="2" name="标题 1"/>
+          <p:cNvSpPr>
+            <a:spLocks noGrp="1"/>
+          </p:cNvSpPr>
+          <p:nvPr>
+            <p:ph type="title"/>
+          </p:nvPr>
+        </p:nvSpPr>
+        <p:spPr/>
+        <p:txBody>
+          <a:bodyPr>
+            <a:normAutofit fontScale="90000"/>
+          </a:bodyPr>
+          <a:p>
+            <a:r>
+              <a:rPr altLang="zh-CN"/>
+              <a:t>Spiral </a:t>
+            </a:r>
+            <a:r>
+              <a:rPr lang="zh-CN" altLang="en-US"/>
+              <a:t>兼容性标记</a:t>
+            </a:r>
+            <a:endParaRPr lang="zh-CN" altLang="en-US"/>
+          </a:p>
+        </p:txBody>
+      </p:sp>
+      <p:sp>
+        <p:nvSpPr>
+          <p:cNvPr id="3" name="内容占位符 2"/>
+          <p:cNvSpPr>
+            <a:spLocks noGrp="1"/>
+          </p:cNvSpPr>
+          <p:nvPr>
+            <p:ph idx="1"/>
+          </p:nvPr>
+        </p:nvSpPr>
+        <p:spPr/>
+        <p:txBody>
+          <a:bodyPr/>
+          <a:p>
+            <a:endParaRPr lang="zh-CN" altLang="en-US"/>
+          </a:p>
+        </p:txBody>
+      </p:sp>
+    </p:spTree>
+  </p:cSld>
+  <p:clrMapOvr>
+    <a:masterClrMapping/>
+  </p:clrMapOvr>
+</p:sld>
+</file>
+
+<file path=ppt/slides/slide23.xml><?xml version="1.0" encoding="utf-8"?>
+<p:sld xmlns:a="http://schemas.openxmlformats.org/drawingml/2006/main" xmlns:r="http://schemas.openxmlformats.org/officeDocument/2006/relationships" xmlns:p="http://schemas.openxmlformats.org/presentationml/2006/main">
+  <p:cSld>
+    <p:spTree>
+      <p:nvGrpSpPr>
+        <p:cNvPr id="1" name=""/>
+        <p:cNvGrpSpPr/>
+        <p:nvPr/>
+      </p:nvGrpSpPr>
+      <p:grpSpPr/>
+      <p:sp>
+        <p:nvSpPr>
+          <p:cNvPr id="2" name="标题 1"/>
+          <p:cNvSpPr>
+            <a:spLocks noGrp="1"/>
+          </p:cNvSpPr>
+          <p:nvPr>
+            <p:ph type="title"/>
+          </p:nvPr>
+        </p:nvSpPr>
+        <p:spPr/>
+        <p:txBody>
+          <a:bodyPr>
+            <a:normAutofit fontScale="90000"/>
+          </a:bodyPr>
+          <a:p>
+            <a:r>
+              <a:rPr lang="zh-CN" altLang="en-US"/>
+              <a:t>走出去：社区外宣工作</a:t>
+            </a:r>
+            <a:endParaRPr lang="zh-CN" altLang="en-US"/>
+          </a:p>
+        </p:txBody>
+      </p:sp>
+      <p:sp>
+        <p:nvSpPr>
+          <p:cNvPr id="3" name="内容占位符 2"/>
+          <p:cNvSpPr>
+            <a:spLocks noGrp="1"/>
+          </p:cNvSpPr>
+          <p:nvPr>
+            <p:ph idx="1"/>
+          </p:nvPr>
+        </p:nvSpPr>
+        <p:spPr/>
+        <p:txBody>
+          <a:bodyPr/>
+          <a:p>
+            <a:endParaRPr lang="zh-CN" altLang="en-US"/>
+          </a:p>
+        </p:txBody>
+      </p:sp>
+    </p:spTree>
+  </p:cSld>
+  <p:clrMapOvr>
+    <a:masterClrMapping/>
+  </p:clrMapOvr>
+</p:sld>
+</file>
+
+<file path=ppt/slides/slide24.xml><?xml version="1.0" encoding="utf-8"?>
+<p:sld xmlns:a="http://schemas.openxmlformats.org/drawingml/2006/main" xmlns:r="http://schemas.openxmlformats.org/officeDocument/2006/relationships" xmlns:p="http://schemas.openxmlformats.org/presentationml/2006/main">
+  <p:cSld>
+    <p:spTree>
+      <p:nvGrpSpPr>
+        <p:cNvPr id="1" name=""/>
+        <p:cNvGrpSpPr/>
+        <p:nvPr/>
+      </p:nvGrpSpPr>
+      <p:grpSpPr/>
+      <p:sp>
+        <p:nvSpPr>
+          <p:cNvPr id="2" name="标题 1"/>
+          <p:cNvSpPr>
+            <a:spLocks noGrp="1"/>
+          </p:cNvSpPr>
+          <p:nvPr>
+            <p:ph type="title"/>
+          </p:nvPr>
+        </p:nvSpPr>
+        <p:spPr/>
+        <p:txBody>
+          <a:bodyPr>
+            <a:normAutofit fontScale="90000"/>
+          </a:bodyPr>
+          <a:p>
+            <a:r>
+              <a:rPr lang="zh-CN" altLang="en-US"/>
+              <a:t>安记冰室</a:t>
+            </a:r>
+            <a:endParaRPr lang="zh-CN" altLang="en-US"/>
+          </a:p>
+        </p:txBody>
+      </p:sp>
+      <p:sp>
+        <p:nvSpPr>
+          <p:cNvPr id="3" name="内容占位符 2"/>
+          <p:cNvSpPr>
+            <a:spLocks noGrp="1"/>
+          </p:cNvSpPr>
+          <p:nvPr>
+            <p:ph idx="1"/>
+          </p:nvPr>
+        </p:nvSpPr>
+        <p:spPr/>
+        <p:txBody>
+          <a:bodyPr/>
+          <a:p>
+            <a:endParaRPr lang="zh-CN" altLang="en-US"/>
+          </a:p>
+        </p:txBody>
+      </p:sp>
+    </p:spTree>
+  </p:cSld>
+  <p:clrMapOvr>
+    <a:masterClrMapping/>
+  </p:clrMapOvr>
+</p:sld>
+</file>
+
+<file path=ppt/slides/slide25.xml><?xml version="1.0" encoding="utf-8"?>
+<p:sld xmlns:a="http://schemas.openxmlformats.org/drawingml/2006/main" xmlns:r="http://schemas.openxmlformats.org/officeDocument/2006/relationships" xmlns:p="http://schemas.openxmlformats.org/presentationml/2006/main">
+  <p:cSld>
+    <p:spTree>
+      <p:nvGrpSpPr>
+        <p:cNvPr id="1" name=""/>
+        <p:cNvGrpSpPr/>
+        <p:nvPr/>
+      </p:nvGrpSpPr>
+      <p:grpSpPr/>
+      <p:sp>
+        <p:nvSpPr>
+          <p:cNvPr id="2" name="标题 1"/>
+          <p:cNvSpPr>
+            <a:spLocks noGrp="1"/>
+          </p:cNvSpPr>
+          <p:nvPr>
+            <p:ph type="title"/>
+          </p:nvPr>
+        </p:nvSpPr>
+        <p:spPr/>
+        <p:txBody>
+          <a:bodyPr>
+            <a:normAutofit fontScale="90000"/>
+          </a:bodyPr>
+          <a:p>
+            <a:r>
+              <a:rPr lang="zh-CN" altLang="en-US"/>
+              <a:t>安同校园行</a:t>
+            </a:r>
+            <a:endParaRPr lang="zh-CN" altLang="en-US"/>
+          </a:p>
+        </p:txBody>
+      </p:sp>
+      <p:sp>
+        <p:nvSpPr>
+          <p:cNvPr id="3" name="内容占位符 2"/>
+          <p:cNvSpPr>
+            <a:spLocks noGrp="1"/>
+          </p:cNvSpPr>
+          <p:nvPr>
+            <p:ph idx="1"/>
+          </p:nvPr>
+        </p:nvSpPr>
+        <p:spPr/>
+        <p:txBody>
+          <a:bodyPr/>
+          <a:p>
+            <a:endParaRPr lang="zh-CN" altLang="en-US"/>
+          </a:p>
+        </p:txBody>
+      </p:sp>
+    </p:spTree>
+  </p:cSld>
+  <p:clrMapOvr>
+    <a:masterClrMapping/>
+  </p:clrMapOvr>
+</p:sld>
+</file>
+
+<file path=ppt/slides/slide26.xml><?xml version="1.0" encoding="utf-8"?>
+<p:sld xmlns:a="http://schemas.openxmlformats.org/drawingml/2006/main" xmlns:r="http://schemas.openxmlformats.org/officeDocument/2006/relationships" xmlns:p="http://schemas.openxmlformats.org/presentationml/2006/main">
+  <p:cSld>
+    <p:spTree>
+      <p:nvGrpSpPr>
+        <p:cNvPr id="1" name=""/>
+        <p:cNvGrpSpPr/>
+        <p:nvPr/>
+      </p:nvGrpSpPr>
+      <p:grpSpPr/>
+      <p:sp>
+        <p:nvSpPr>
+          <p:cNvPr id="2" name="标题 1"/>
+          <p:cNvSpPr>
+            <a:spLocks noGrp="1"/>
+          </p:cNvSpPr>
+          <p:nvPr>
+            <p:ph type="title"/>
+          </p:nvPr>
+        </p:nvSpPr>
+        <p:spPr/>
+        <p:txBody>
+          <a:bodyPr>
+            <a:normAutofit fontScale="90000"/>
+          </a:bodyPr>
+          <a:p>
+            <a:r>
+              <a:rPr lang="zh-CN" altLang="en-US"/>
+              <a:t>国产硬件与信创草根化</a:t>
+            </a:r>
+            <a:endParaRPr lang="zh-CN" altLang="en-US"/>
+          </a:p>
+        </p:txBody>
+      </p:sp>
+      <p:sp>
+        <p:nvSpPr>
+          <p:cNvPr id="3" name="内容占位符 2"/>
+          <p:cNvSpPr>
+            <a:spLocks noGrp="1"/>
+          </p:cNvSpPr>
+          <p:nvPr>
+            <p:ph idx="1"/>
+          </p:nvPr>
+        </p:nvSpPr>
+        <p:spPr/>
+        <p:txBody>
+          <a:bodyPr/>
+          <a:p>
+            <a:endParaRPr lang="zh-CN" altLang="en-US"/>
+          </a:p>
+        </p:txBody>
+      </p:sp>
+    </p:spTree>
+  </p:cSld>
+  <p:clrMapOvr>
+    <a:masterClrMapping/>
+  </p:clrMapOvr>
+</p:sld>
+</file>
+
+<file path=ppt/slides/slide27.xml><?xml version="1.0" encoding="utf-8"?>
+<p:sld xmlns:a="http://schemas.openxmlformats.org/drawingml/2006/main" xmlns:r="http://schemas.openxmlformats.org/officeDocument/2006/relationships" xmlns:p="http://schemas.openxmlformats.org/presentationml/2006/main">
+  <p:cSld>
+    <p:spTree>
+      <p:nvGrpSpPr>
+        <p:cNvPr id="1" name=""/>
+        <p:cNvGrpSpPr/>
+        <p:nvPr/>
+      </p:nvGrpSpPr>
+      <p:grpSpPr/>
+      <p:sp>
+        <p:nvSpPr>
+          <p:cNvPr id="4" name="文本占位符 3"/>
+          <p:cNvSpPr>
+            <a:spLocks noGrp="1"/>
+          </p:cNvSpPr>
+          <p:nvPr>
+            <p:ph type="body" sz="quarter" idx="13"/>
+          </p:nvPr>
+        </p:nvSpPr>
+        <p:spPr/>
+        <p:txBody>
+          <a:bodyPr/>
+          <a:p>
+            <a:endParaRPr lang="zh-CN" altLang="en-US" sz="3600"/>
+          </a:p>
+          <a:p>
+            <a:pPr fontAlgn="auto">
+              <a:spcBef>
+                <a:spcPts val="300"/>
+              </a:spcBef>
+            </a:pPr>
+            <a:br>
+              <a:rPr lang="zh-CN" altLang="en-US" sz="3600">
+                <a:sym typeface="+mn-ea"/>
+              </a:rPr>
+            </a:br>
+            <a:r>
+              <a:rPr lang="zh-CN" altLang="en-US" sz="3600">
+                <a:sym typeface="+mn-ea"/>
+              </a:rPr>
+              <a:t>那么，代价是什么呢？</a:t>
+            </a:r>
+            <a:endParaRPr lang="zh-CN" altLang="en-US" sz="3600">
+              <a:sym typeface="+mn-ea"/>
+            </a:endParaRPr>
+          </a:p>
+          <a:p>
+            <a:pPr fontAlgn="auto">
+              <a:spcBef>
+                <a:spcPts val="300"/>
+              </a:spcBef>
+            </a:pPr>
+            <a:r>
+              <a:rPr lang="zh-CN" altLang="en-US" sz="2800"/>
+              <a:t>（又有什么新老挑战？）</a:t>
+            </a:r>
+            <a:endParaRPr lang="zh-CN" altLang="en-US" sz="2800"/>
+          </a:p>
+        </p:txBody>
+      </p:sp>
+    </p:spTree>
+  </p:cSld>
+  <p:clrMapOvr>
+    <a:masterClrMapping/>
+  </p:clrMapOvr>
+</p:sld>
+</file>
+
+<file path=ppt/slides/slide28.xml><?xml version="1.0" encoding="utf-8"?>
+<p:sld xmlns:a="http://schemas.openxmlformats.org/drawingml/2006/main" xmlns:r="http://schemas.openxmlformats.org/officeDocument/2006/relationships" xmlns:p="http://schemas.openxmlformats.org/presentationml/2006/main">
+  <p:cSld>
+    <p:spTree>
+      <p:nvGrpSpPr>
+        <p:cNvPr id="1" name=""/>
+        <p:cNvGrpSpPr/>
+        <p:nvPr/>
+      </p:nvGrpSpPr>
+      <p:grpSpPr/>
+      <p:sp>
+        <p:nvSpPr>
+          <p:cNvPr id="2" name="标题 1"/>
+          <p:cNvSpPr>
+            <a:spLocks noGrp="1"/>
+          </p:cNvSpPr>
+          <p:nvPr>
+            <p:ph type="title"/>
+          </p:nvPr>
+        </p:nvSpPr>
+        <p:spPr/>
+        <p:txBody>
+          <a:bodyPr>
+            <a:normAutofit fontScale="90000"/>
+          </a:bodyPr>
+          <a:p>
+            <a:r>
+              <a:rPr lang="zh-CN" altLang="en-US"/>
+              <a:t>在丑话之前</a:t>
+            </a:r>
+            <a:endParaRPr lang="zh-CN" altLang="en-US"/>
+          </a:p>
+        </p:txBody>
+      </p:sp>
+      <p:sp>
+        <p:nvSpPr>
+          <p:cNvPr id="3" name="内容占位符 2"/>
+          <p:cNvSpPr>
+            <a:spLocks noGrp="1"/>
+          </p:cNvSpPr>
+          <p:nvPr>
+            <p:ph idx="1"/>
+          </p:nvPr>
+        </p:nvSpPr>
+        <p:spPr/>
+        <p:txBody>
+          <a:bodyPr/>
+          <a:p>
+            <a:r>
+              <a:rPr lang="zh-CN" altLang="en-US"/>
+              <a:t>社区的专业与热情有目共睹</a:t>
+            </a:r>
+            <a:endParaRPr lang="zh-CN" altLang="en-US"/>
+          </a:p>
+          <a:p>
+            <a:pPr lvl="1"/>
+            <a:r>
+              <a:rPr lang="zh-CN" altLang="en-US"/>
+              <a:t>专业态度与行动力毋庸置疑</a:t>
+            </a:r>
+            <a:endParaRPr lang="zh-CN" altLang="en-US"/>
+          </a:p>
+          <a:p>
+            <a:pPr lvl="1"/>
+            <a:r>
+              <a:rPr lang="zh-CN" altLang="en-US"/>
+              <a:t>支持与服务意识堪称模范</a:t>
+            </a:r>
+            <a:endParaRPr lang="zh-CN" altLang="en-US"/>
+          </a:p>
+          <a:p>
+            <a:pPr lvl="0"/>
+            <a:r>
+              <a:rPr lang="zh-CN" altLang="en-US"/>
+              <a:t>社区资源持续发挥积极作用</a:t>
+            </a:r>
+            <a:endParaRPr lang="zh-CN" altLang="en-US"/>
+          </a:p>
+          <a:p>
+            <a:pPr lvl="1"/>
+            <a:r>
+              <a:rPr lang="zh-CN" altLang="en-US"/>
+              <a:t>新贡献者得到较为充分的支持和培训</a:t>
+            </a:r>
+            <a:endParaRPr lang="zh-CN" altLang="en-US"/>
+          </a:p>
+          <a:p>
+            <a:pPr lvl="1"/>
+            <a:r>
+              <a:rPr lang="zh-CN" altLang="en-US"/>
+              <a:t>实习与校园交流活动逐渐成为稳定工作目标</a:t>
+            </a:r>
+            <a:endParaRPr lang="zh-CN" altLang="en-US"/>
+          </a:p>
+          <a:p>
+            <a:pPr lvl="0"/>
+            <a:r>
+              <a:rPr lang="zh-CN" altLang="en-US"/>
+              <a:t>社区内外支持依然坚实</a:t>
+            </a:r>
+            <a:endParaRPr lang="zh-CN" altLang="en-US"/>
+          </a:p>
+          <a:p>
+            <a:pPr lvl="1"/>
+            <a:r>
+              <a:rPr lang="zh-CN" altLang="en-US"/>
+              <a:t>众筹、活动审批与行业认可</a:t>
+            </a:r>
+            <a:endParaRPr lang="zh-CN" altLang="en-US"/>
+          </a:p>
+        </p:txBody>
+      </p:sp>
+    </p:spTree>
+  </p:cSld>
+  <p:clrMapOvr>
+    <a:masterClrMapping/>
+  </p:clrMapOvr>
+</p:sld>
+</file>
+
+<file path=ppt/slides/slide29.xml><?xml version="1.0" encoding="utf-8"?>
+<p:sld xmlns:a="http://schemas.openxmlformats.org/drawingml/2006/main" xmlns:r="http://schemas.openxmlformats.org/officeDocument/2006/relationships" xmlns:p="http://schemas.openxmlformats.org/presentationml/2006/main">
+  <p:cSld>
+    <p:spTree>
+      <p:nvGrpSpPr>
+        <p:cNvPr id="1" name=""/>
+        <p:cNvGrpSpPr/>
+        <p:nvPr/>
+      </p:nvGrpSpPr>
+      <p:grpSpPr/>
+      <p:sp>
+        <p:nvSpPr>
+          <p:cNvPr id="2" name="标题 1"/>
+          <p:cNvSpPr>
+            <a:spLocks noGrp="1"/>
+          </p:cNvSpPr>
+          <p:nvPr>
+            <p:ph type="title"/>
+          </p:nvPr>
+        </p:nvSpPr>
+        <p:spPr/>
+        <p:txBody>
+          <a:bodyPr>
+            <a:normAutofit fontScale="90000"/>
+          </a:bodyPr>
+          <a:p>
+            <a:r>
+              <a:rPr lang="zh-CN" altLang="en-US"/>
+              <a:t>从内部看：超速与过热的社区</a:t>
+            </a:r>
+            <a:endParaRPr lang="zh-CN" altLang="en-US"/>
+          </a:p>
+        </p:txBody>
+      </p:sp>
+      <p:sp>
+        <p:nvSpPr>
+          <p:cNvPr id="3" name="内容占位符 2"/>
+          <p:cNvSpPr>
+            <a:spLocks noGrp="1"/>
+          </p:cNvSpPr>
+          <p:nvPr>
+            <p:ph idx="1"/>
+          </p:nvPr>
+        </p:nvSpPr>
+        <p:spPr/>
+        <p:txBody>
+          <a:bodyPr/>
+          <a:p>
+            <a:r>
+              <a:rPr lang="zh-CN" altLang="en-US"/>
+              <a:t>一些核心问题</a:t>
+            </a:r>
+            <a:endParaRPr lang="zh-CN" altLang="en-US"/>
+          </a:p>
+          <a:p>
+            <a:pPr lvl="1"/>
+            <a:r>
+              <a:rPr lang="zh-CN" altLang="en-US"/>
+              <a:t>民主议事难言充分到位</a:t>
+            </a:r>
+            <a:endParaRPr lang="zh-CN" altLang="en-US"/>
+          </a:p>
+          <a:p>
+            <a:pPr lvl="1"/>
+            <a:r>
+              <a:rPr lang="zh-CN" altLang="en-US"/>
+              <a:t>集体与个人主义的矛盾重合</a:t>
+            </a:r>
+            <a:endParaRPr lang="zh-CN" altLang="en-US"/>
+          </a:p>
+          <a:p>
+            <a:pPr lvl="1"/>
+            <a:r>
+              <a:rPr lang="zh-CN" altLang="en-US"/>
+              <a:t>建设性讨论中互信不足</a:t>
+            </a:r>
+            <a:endParaRPr lang="zh-CN" altLang="en-US"/>
+          </a:p>
+          <a:p>
+            <a:pPr lvl="1"/>
+            <a:r>
+              <a:rPr lang="zh-CN" altLang="en-US"/>
+              <a:t>资历与平等参与的矛盾</a:t>
+            </a:r>
+            <a:endParaRPr lang="zh-CN" altLang="en-US"/>
+          </a:p>
+          <a:p>
+            <a:pPr lvl="1"/>
+            <a:r>
+              <a:rPr lang="zh-CN" altLang="en-US"/>
+              <a:t>开发者、用户与安全空间的多重需求</a:t>
+            </a:r>
+            <a:endParaRPr lang="zh-CN" altLang="en-US"/>
+          </a:p>
+          <a:p>
+            <a:pPr lvl="1"/>
+            <a:r>
+              <a:rPr lang="zh-CN" altLang="en-US"/>
+              <a:t>志愿性原则的矫枉过正</a:t>
+            </a:r>
+            <a:endParaRPr lang="zh-CN" altLang="en-US"/>
+          </a:p>
+          <a:p>
+            <a:pPr lvl="0"/>
+            <a:r>
+              <a:rPr lang="zh-CN" altLang="en-US"/>
+              <a:t>大多不是我社特有的问题</a:t>
+            </a:r>
+            <a:endParaRPr lang="zh-CN" altLang="en-US"/>
+          </a:p>
+          <a:p>
+            <a:pPr lvl="1"/>
+            <a:r>
+              <a:rPr lang="zh-CN" altLang="en-US"/>
+              <a:t>但社区的存在就是为了解决问题！</a:t>
+            </a:r>
+            <a:endParaRPr lang="zh-CN" altLang="en-US"/>
+          </a:p>
+        </p:txBody>
+      </p:sp>
+    </p:spTree>
+  </p:cSld>
+  <p:clrMapOvr>
+    <a:masterClrMapping/>
+  </p:clrMapOvr>
+</p:sld>
+</file>
+
+<file path=ppt/slides/slide3.xml><?xml version="1.0" encoding="utf-8"?>
+<p:sld xmlns:a="http://schemas.openxmlformats.org/drawingml/2006/main" xmlns:r="http://schemas.openxmlformats.org/officeDocument/2006/relationships" xmlns:p="http://schemas.openxmlformats.org/presentationml/2006/main">
+  <p:cSld>
+    <p:spTree>
+      <p:nvGrpSpPr>
+        <p:cNvPr id="1" name=""/>
+        <p:cNvGrpSpPr/>
+        <p:nvPr/>
+      </p:nvGrpSpPr>
+      <p:grpSpPr/>
+      <p:sp>
+        <p:nvSpPr>
+          <p:cNvPr id="2" name="标题 1"/>
+          <p:cNvSpPr>
+            <a:spLocks noGrp="1"/>
+          </p:cNvSpPr>
+          <p:nvPr>
+            <p:ph type="title"/>
+          </p:nvPr>
+        </p:nvSpPr>
+        <p:spPr/>
+        <p:txBody>
+          <a:bodyPr>
+            <a:normAutofit fontScale="90000"/>
+          </a:bodyPr>
+          <a:p>
+            <a:r>
+              <a:rPr lang="zh-CN" altLang="en-US"/>
+              <a:t>诶呀，咋搁这儿来了！</a:t>
+            </a:r>
+            <a:endParaRPr lang="zh-CN" altLang="en-US"/>
+          </a:p>
+        </p:txBody>
+      </p:sp>
+      <p:sp>
+        <p:nvSpPr>
+          <p:cNvPr id="3" name="内容占位符 2"/>
+          <p:cNvSpPr>
+            <a:spLocks noGrp="1"/>
+          </p:cNvSpPr>
+          <p:nvPr>
+            <p:ph idx="1"/>
+          </p:nvPr>
+        </p:nvSpPr>
+        <p:spPr/>
+        <p:txBody>
+          <a:bodyPr/>
+          <a:p>
+            <a:r>
+              <a:rPr lang="en-US" altLang="zh-CN"/>
+              <a:t>AOSCC </a:t>
+            </a:r>
+            <a:r>
+              <a:rPr lang="zh-CN" altLang="en-US"/>
+              <a:t>第一次走进东北</a:t>
+            </a:r>
+            <a:endParaRPr lang="zh-CN" altLang="en-US"/>
+          </a:p>
+          <a:p>
+            <a:pPr lvl="0"/>
+            <a:r>
+              <a:rPr lang="zh-CN" altLang="en-US"/>
+              <a:t>本届</a:t>
+            </a:r>
+            <a:r>
+              <a:rPr lang="en-US" altLang="zh-CN"/>
+              <a:t> AOSCC </a:t>
+            </a:r>
+            <a:r>
+              <a:rPr lang="zh-CN" altLang="en-US"/>
+              <a:t>有史以来</a:t>
+            </a:r>
+            <a:endParaRPr lang="zh-CN" altLang="en-US"/>
+          </a:p>
+          <a:p>
+            <a:pPr lvl="1"/>
+            <a:r>
+              <a:rPr lang="zh-CN" altLang="en-US"/>
+              <a:t>与会者最多</a:t>
+            </a:r>
+            <a:endParaRPr lang="zh-CN" altLang="en-US"/>
+          </a:p>
+          <a:p>
+            <a:pPr lvl="1"/>
+            <a:r>
+              <a:rPr lang="zh-CN" altLang="en-US"/>
+              <a:t>参与社区最众</a:t>
+            </a:r>
+            <a:endParaRPr lang="zh-CN" altLang="en-US"/>
+          </a:p>
+          <a:p>
+            <a:pPr lvl="1"/>
+            <a:r>
+              <a:rPr lang="zh-CN" altLang="en-US"/>
+              <a:t>课题最多样</a:t>
+            </a:r>
+            <a:endParaRPr lang="zh-CN" altLang="en-US"/>
+          </a:p>
+          <a:p>
+            <a:pPr lvl="1"/>
+            <a:r>
+              <a:rPr lang="zh-CN" altLang="en-US"/>
+              <a:t>周边最丰富</a:t>
+            </a:r>
+            <a:endParaRPr lang="zh-CN" altLang="en-US"/>
+          </a:p>
+          <a:p>
+            <a:pPr lvl="1"/>
+            <a:r>
+              <a:rPr lang="zh-CN" altLang="en-US" strike="sngStrike">
+                <a:solidFill>
+                  <a:schemeClr val="tx1">
+                    <a:lumMod val="95000"/>
+                    <a:lumOff val="5000"/>
+                  </a:schemeClr>
+                </a:solidFill>
+                <a:uFillTx/>
+              </a:rPr>
+              <a:t>预算最爆炸</a:t>
+            </a:r>
+            <a:endParaRPr lang="zh-CN" altLang="en-US" strike="sngStrike">
+              <a:solidFill>
+                <a:schemeClr val="tx1">
+                  <a:lumMod val="95000"/>
+                  <a:lumOff val="5000"/>
+                </a:schemeClr>
+              </a:solidFill>
+              <a:uFillTx/>
+            </a:endParaRPr>
+          </a:p>
+        </p:txBody>
+      </p:sp>
+    </p:spTree>
+  </p:cSld>
+  <p:clrMapOvr>
+    <a:masterClrMapping/>
+  </p:clrMapOvr>
+</p:sld>
+</file>
+
+<file path=ppt/slides/slide30.xml><?xml version="1.0" encoding="utf-8"?>
+<p:sld xmlns:a="http://schemas.openxmlformats.org/drawingml/2006/main" xmlns:r="http://schemas.openxmlformats.org/officeDocument/2006/relationships" xmlns:p="http://schemas.openxmlformats.org/presentationml/2006/main">
+  <p:cSld>
+    <p:spTree>
+      <p:nvGrpSpPr>
+        <p:cNvPr id="1" name=""/>
+        <p:cNvGrpSpPr/>
+        <p:nvPr/>
+      </p:nvGrpSpPr>
+      <p:grpSpPr/>
+      <p:sp>
+        <p:nvSpPr>
+          <p:cNvPr id="2" name="标题 1"/>
+          <p:cNvSpPr>
+            <a:spLocks noGrp="1"/>
+          </p:cNvSpPr>
+          <p:nvPr>
+            <p:ph type="title"/>
+          </p:nvPr>
+        </p:nvSpPr>
+        <p:spPr/>
+        <p:txBody>
+          <a:bodyPr>
+            <a:normAutofit fontScale="90000"/>
+          </a:bodyPr>
+          <a:p>
+            <a:r>
+              <a:rPr lang="zh-CN" altLang="en-US"/>
+              <a:t>从外部看：日渐狭窄的生存空间</a:t>
+            </a:r>
+            <a:endParaRPr lang="zh-CN" altLang="en-US"/>
+          </a:p>
+        </p:txBody>
+      </p:sp>
+      <p:sp>
+        <p:nvSpPr>
+          <p:cNvPr id="3" name="内容占位符 2"/>
+          <p:cNvSpPr>
+            <a:spLocks noGrp="1"/>
+          </p:cNvSpPr>
+          <p:nvPr>
+            <p:ph idx="1"/>
+          </p:nvPr>
+        </p:nvSpPr>
+        <p:spPr/>
+        <p:txBody>
+          <a:bodyPr/>
+          <a:p>
+            <a:r>
+              <a:rPr lang="zh-CN" altLang="en-US"/>
+              <a:t>草根社区的生存斗争</a:t>
+            </a:r>
+            <a:endParaRPr lang="zh-CN" altLang="en-US"/>
+          </a:p>
+          <a:p>
+            <a:pPr lvl="1"/>
+            <a:r>
+              <a:rPr lang="zh-CN" altLang="en-US"/>
+              <a:t>独立自主与开放平等的各类代价</a:t>
+            </a:r>
+            <a:endParaRPr lang="zh-CN" altLang="en-US"/>
+          </a:p>
+          <a:p>
+            <a:pPr lvl="1"/>
+            <a:r>
+              <a:rPr lang="zh-CN" altLang="en-US"/>
+              <a:t>被滥用的概念与不切实际的期望</a:t>
+            </a:r>
+            <a:endParaRPr lang="zh-CN" altLang="en-US"/>
+          </a:p>
+          <a:p>
+            <a:pPr lvl="0"/>
+            <a:r>
+              <a:rPr lang="zh-CN" altLang="en-US"/>
+              <a:t>社区与企业冤家路窄？</a:t>
+            </a:r>
+            <a:endParaRPr lang="zh-CN" altLang="en-US"/>
+          </a:p>
+          <a:p>
+            <a:pPr lvl="1"/>
+            <a:r>
+              <a:rPr lang="zh-CN" altLang="en-US"/>
+              <a:t>社区无意愿亦无能力对抗行业</a:t>
+            </a:r>
+            <a:endParaRPr lang="zh-CN" altLang="en-US"/>
+          </a:p>
+          <a:p>
+            <a:pPr lvl="1"/>
+            <a:r>
+              <a:rPr lang="zh-CN" altLang="en-US"/>
+              <a:t>社区参与者的身份重叠</a:t>
+            </a:r>
+            <a:endParaRPr lang="zh-CN" altLang="en-US"/>
+          </a:p>
+          <a:p>
+            <a:pPr lvl="1"/>
+            <a:r>
+              <a:rPr lang="zh-CN" altLang="en-US"/>
+              <a:t>如何平衡社区利益与行业协作</a:t>
+            </a:r>
+            <a:endParaRPr lang="zh-CN" altLang="en-US"/>
+          </a:p>
+        </p:txBody>
+      </p:sp>
+    </p:spTree>
+  </p:cSld>
+  <p:clrMapOvr>
+    <a:masterClrMapping/>
+  </p:clrMapOvr>
+</p:sld>
+</file>
+
+<file path=ppt/slides/slide31.xml><?xml version="1.0" encoding="utf-8"?>
+<p:sld xmlns:a="http://schemas.openxmlformats.org/drawingml/2006/main" xmlns:r="http://schemas.openxmlformats.org/officeDocument/2006/relationships" xmlns:p="http://schemas.openxmlformats.org/presentationml/2006/main">
+  <p:cSld>
+    <p:spTree>
+      <p:nvGrpSpPr>
+        <p:cNvPr id="1" name=""/>
+        <p:cNvGrpSpPr/>
+        <p:nvPr/>
+      </p:nvGrpSpPr>
+      <p:grpSpPr/>
+      <p:sp>
+        <p:nvSpPr>
+          <p:cNvPr id="2" name="标题 1"/>
+          <p:cNvSpPr>
+            <a:spLocks noGrp="1"/>
+          </p:cNvSpPr>
+          <p:nvPr>
+            <p:ph type="title"/>
+          </p:nvPr>
+        </p:nvSpPr>
+        <p:spPr/>
+        <p:txBody>
+          <a:bodyPr>
+            <a:normAutofit fontScale="90000"/>
+          </a:bodyPr>
+          <a:p>
+            <a:r>
+              <a:rPr lang="zh-CN" altLang="en-US"/>
+              <a:t>潜在解决方案</a:t>
+            </a:r>
+            <a:endParaRPr lang="zh-CN" altLang="en-US"/>
+          </a:p>
+        </p:txBody>
+      </p:sp>
+      <p:sp>
+        <p:nvSpPr>
+          <p:cNvPr id="3" name="内容占位符 2"/>
+          <p:cNvSpPr>
+            <a:spLocks noGrp="1"/>
+          </p:cNvSpPr>
+          <p:nvPr>
+            <p:ph idx="1"/>
+          </p:nvPr>
+        </p:nvSpPr>
+        <p:spPr/>
+        <p:txBody>
+          <a:bodyPr/>
+          <a:p>
+            <a:r>
+              <a:rPr lang="zh-CN" altLang="en-US"/>
+              <a:t>内部挑战</a:t>
+            </a:r>
+            <a:endParaRPr lang="zh-CN" altLang="en-US"/>
+          </a:p>
+          <a:p>
+            <a:pPr lvl="1"/>
+            <a:r>
+              <a:rPr lang="zh-CN" altLang="en-US"/>
+              <a:t>贡献者提高协作、时间计划和透明度意识</a:t>
+            </a:r>
+            <a:endParaRPr lang="zh-CN" altLang="en-US"/>
+          </a:p>
+          <a:p>
+            <a:pPr lvl="1"/>
+            <a:r>
+              <a:rPr lang="zh-CN" altLang="en-US"/>
+              <a:t>轮值树洞：匿名反馈，集体讨论</a:t>
+            </a:r>
+            <a:endParaRPr lang="zh-CN" altLang="en-US"/>
+          </a:p>
+          <a:p>
+            <a:pPr lvl="2"/>
+            <a:r>
+              <a:rPr lang="zh-CN" altLang="en-US" sz="2000"/>
+              <a:t>如有条件可安排区域性贡献者活动</a:t>
+            </a:r>
+            <a:endParaRPr lang="zh-CN" altLang="en-US"/>
+          </a:p>
+          <a:p>
+            <a:pPr lvl="1"/>
+            <a:r>
+              <a:rPr lang="zh-CN" altLang="en-US"/>
+              <a:t>从资深贡献者中探寻与培养更多的调停者与组织者</a:t>
+            </a:r>
+            <a:endParaRPr lang="zh-CN" altLang="en-US"/>
+          </a:p>
+          <a:p>
+            <a:pPr lvl="0"/>
+            <a:r>
+              <a:rPr lang="zh-CN" altLang="en-US"/>
+              <a:t>外部挑战</a:t>
+            </a:r>
+            <a:endParaRPr lang="zh-CN" altLang="en-US"/>
+          </a:p>
+          <a:p>
+            <a:pPr lvl="1"/>
+            <a:r>
+              <a:rPr lang="zh-CN" altLang="en-US"/>
+              <a:t>自律合规地推进外宣，证明社区的存在与意义</a:t>
+            </a:r>
+            <a:endParaRPr lang="zh-CN" altLang="en-US"/>
+          </a:p>
+          <a:p>
+            <a:pPr lvl="1"/>
+            <a:r>
+              <a:rPr lang="zh-CN" altLang="en-US"/>
+              <a:t>坚持协作，充分表达善意与合作意愿</a:t>
+            </a:r>
+            <a:endParaRPr lang="zh-CN" altLang="en-US"/>
+          </a:p>
+          <a:p>
+            <a:pPr lvl="1"/>
+            <a:r>
+              <a:rPr lang="zh-CN" altLang="en-US"/>
+              <a:t>身体力行地发挥监督与示范作用</a:t>
+            </a:r>
+            <a:endParaRPr lang="zh-CN" altLang="en-US"/>
+          </a:p>
+        </p:txBody>
+      </p:sp>
+    </p:spTree>
+  </p:cSld>
+  <p:clrMapOvr>
+    <a:masterClrMapping/>
+  </p:clrMapOvr>
+</p:sld>
+</file>
+
+<file path=ppt/slides/slide32.xml><?xml version="1.0" encoding="utf-8"?>
+<p:sld xmlns:a="http://schemas.openxmlformats.org/drawingml/2006/main" xmlns:r="http://schemas.openxmlformats.org/officeDocument/2006/relationships" xmlns:p="http://schemas.openxmlformats.org/presentationml/2006/main">
+  <p:cSld>
+    <p:spTree>
+      <p:nvGrpSpPr>
+        <p:cNvPr id="1" name=""/>
+        <p:cNvGrpSpPr/>
+        <p:nvPr/>
+      </p:nvGrpSpPr>
+      <p:grpSpPr/>
+      <p:sp>
+        <p:nvSpPr>
+          <p:cNvPr id="2" name="标题 1"/>
+          <p:cNvSpPr>
+            <a:spLocks noGrp="1"/>
+          </p:cNvSpPr>
+          <p:nvPr>
+            <p:ph type="title"/>
+          </p:nvPr>
+        </p:nvSpPr>
+        <p:spPr/>
+        <p:txBody>
+          <a:bodyPr>
+            <a:normAutofit fontScale="90000"/>
+          </a:bodyPr>
+          <a:p>
+            <a:r>
+              <a:rPr lang="zh-CN" altLang="en-US"/>
+              <a:t>几点坚持</a:t>
+            </a:r>
+            <a:endParaRPr lang="zh-CN" altLang="en-US"/>
+          </a:p>
+        </p:txBody>
+      </p:sp>
+      <p:sp>
+        <p:nvSpPr>
+          <p:cNvPr id="3" name="内容占位符 2"/>
+          <p:cNvSpPr>
+            <a:spLocks noGrp="1"/>
+          </p:cNvSpPr>
+          <p:nvPr>
+            <p:ph idx="1"/>
+          </p:nvPr>
+        </p:nvSpPr>
+        <p:spPr/>
+        <p:txBody>
+          <a:bodyPr/>
+          <a:p>
+            <a:r>
+              <a:rPr lang="zh-CN" altLang="en-US"/>
+              <a:t>不论条件如何，独善其身才是社区的生存之道</a:t>
+            </a:r>
+            <a:endParaRPr lang="zh-CN" altLang="en-US"/>
+          </a:p>
+          <a:p>
+            <a:r>
+              <a:rPr lang="zh-CN" altLang="en-US"/>
+              <a:t>坚持发挥积极作用</a:t>
+            </a:r>
+            <a:endParaRPr lang="zh-CN" altLang="en-US"/>
+          </a:p>
+          <a:p>
+            <a:pPr lvl="1"/>
+            <a:r>
+              <a:rPr lang="zh-CN" altLang="en-US"/>
+              <a:t>通过校园行为校园社区破除信息壁垒、争取支持</a:t>
+            </a:r>
+            <a:endParaRPr lang="zh-CN" altLang="en-US"/>
+          </a:p>
+          <a:p>
+            <a:pPr lvl="1"/>
+            <a:r>
+              <a:rPr lang="zh-CN" altLang="en-US"/>
+              <a:t>参与</a:t>
+            </a:r>
+            <a:r>
+              <a:rPr lang="en-US" altLang="zh-CN"/>
+              <a:t> OSPP </a:t>
+            </a:r>
+            <a:r>
+              <a:rPr lang="zh-CN" altLang="en-US"/>
+              <a:t>等活动，让尽可能多的学生参与社区</a:t>
+            </a:r>
+            <a:endParaRPr lang="zh-CN" altLang="en-US"/>
+          </a:p>
+          <a:p>
+            <a:pPr lvl="1"/>
+            <a:r>
+              <a:rPr lang="zh-CN" altLang="en-US"/>
+              <a:t>坚持独立、自主、志愿驱动，留存社区净土</a:t>
+            </a:r>
+            <a:endParaRPr lang="zh-CN" altLang="en-US"/>
+          </a:p>
+          <a:p>
+            <a:pPr lvl="0"/>
+            <a:r>
+              <a:rPr lang="zh-CN" altLang="en-US"/>
+              <a:t>我们的存在不是借口</a:t>
+            </a:r>
+            <a:endParaRPr lang="zh-CN" altLang="en-US"/>
+          </a:p>
+          <a:p>
+            <a:pPr lvl="1"/>
+            <a:r>
+              <a:rPr lang="zh-CN" altLang="en-US"/>
+              <a:t>我们要证明社区的力量</a:t>
+            </a:r>
+            <a:endParaRPr lang="zh-CN" altLang="en-US"/>
+          </a:p>
+        </p:txBody>
+      </p:sp>
+    </p:spTree>
+  </p:cSld>
+  <p:clrMapOvr>
+    <a:masterClrMapping/>
+  </p:clrMapOvr>
+</p:sld>
+</file>
+
+<file path=ppt/slides/slide33.xml><?xml version="1.0" encoding="utf-8"?>
+<p:sld xmlns:a="http://schemas.openxmlformats.org/drawingml/2006/main" xmlns:r="http://schemas.openxmlformats.org/officeDocument/2006/relationships" xmlns:p="http://schemas.openxmlformats.org/presentationml/2006/main">
+  <p:cSld>
+    <p:spTree>
+      <p:nvGrpSpPr>
+        <p:cNvPr id="1" name=""/>
+        <p:cNvGrpSpPr/>
+        <p:nvPr/>
+      </p:nvGrpSpPr>
+      <p:grpSpPr/>
+      <p:sp>
+        <p:nvSpPr>
+          <p:cNvPr id="4" name="文本占位符 3"/>
+          <p:cNvSpPr>
+            <a:spLocks noGrp="1"/>
+          </p:cNvSpPr>
+          <p:nvPr>
+            <p:ph type="body" sz="quarter" idx="13"/>
+          </p:nvPr>
+        </p:nvSpPr>
+        <p:spPr/>
+        <p:txBody>
+          <a:bodyPr/>
+          <a:p>
+            <a:endParaRPr lang="zh-CN" altLang="en-US" sz="3600"/>
+          </a:p>
+          <a:p>
+            <a:pPr fontAlgn="auto">
+              <a:spcBef>
+                <a:spcPts val="300"/>
+              </a:spcBef>
+            </a:pPr>
+            <a:br>
+              <a:rPr lang="zh-CN" altLang="en-US" sz="3600">
+                <a:sym typeface="+mn-ea"/>
+              </a:rPr>
+            </a:br>
+            <a:r>
+              <a:rPr lang="zh-CN" altLang="en-US" sz="3600">
+                <a:sym typeface="+mn-ea"/>
+              </a:rPr>
+              <a:t>来年有何计划？</a:t>
+            </a:r>
+            <a:endParaRPr lang="zh-CN" altLang="en-US" sz="2800"/>
+          </a:p>
+        </p:txBody>
+      </p:sp>
+    </p:spTree>
+  </p:cSld>
+  <p:clrMapOvr>
+    <a:masterClrMapping/>
+  </p:clrMapOvr>
+</p:sld>
+</file>
+
+<file path=ppt/slides/slide34.xml><?xml version="1.0" encoding="utf-8"?>
+<p:sld xmlns:a="http://schemas.openxmlformats.org/drawingml/2006/main" xmlns:r="http://schemas.openxmlformats.org/officeDocument/2006/relationships" xmlns:p="http://schemas.openxmlformats.org/presentationml/2006/main">
+  <p:cSld>
+    <p:spTree>
+      <p:nvGrpSpPr>
+        <p:cNvPr id="1" name=""/>
+        <p:cNvGrpSpPr/>
+        <p:nvPr/>
+      </p:nvGrpSpPr>
+      <p:grpSpPr/>
+      <p:sp>
+        <p:nvSpPr>
+          <p:cNvPr id="6" name="标题 5"/>
+          <p:cNvSpPr>
+            <a:spLocks noGrp="1"/>
+          </p:cNvSpPr>
+          <p:nvPr>
+            <p:ph type="title"/>
+          </p:nvPr>
+        </p:nvSpPr>
+        <p:spPr/>
+        <p:txBody>
+          <a:bodyPr>
+            <a:normAutofit fontScale="90000"/>
+          </a:bodyPr>
+          <a:p>
+            <a:endParaRPr lang="zh-CN" altLang="en-US"/>
+          </a:p>
+        </p:txBody>
+      </p:sp>
+      <p:sp>
+        <p:nvSpPr>
+          <p:cNvPr id="7" name="内容占位符 6"/>
+          <p:cNvSpPr>
+            <a:spLocks noGrp="1"/>
+          </p:cNvSpPr>
+          <p:nvPr>
+            <p:ph idx="1"/>
+          </p:nvPr>
+        </p:nvSpPr>
+        <p:spPr/>
+        <p:txBody>
+          <a:bodyPr/>
+          <a:p>
+            <a:endParaRPr lang="zh-CN" altLang="en-US"/>
+          </a:p>
+        </p:txBody>
+      </p:sp>
+    </p:spTree>
+  </p:cSld>
+  <p:clrMapOvr>
+    <a:masterClrMapping/>
+  </p:clrMapOvr>
+</p:sld>
+</file>
+
+<file path=ppt/slides/slide35.xml><?xml version="1.0" encoding="utf-8"?>
+<p:sld xmlns:a="http://schemas.openxmlformats.org/drawingml/2006/main" xmlns:r="http://schemas.openxmlformats.org/officeDocument/2006/relationships" xmlns:p="http://schemas.openxmlformats.org/presentationml/2006/main">
+  <p:cSld>
+    <p:spTree>
+      <p:nvGrpSpPr>
+        <p:cNvPr id="1" name=""/>
+        <p:cNvGrpSpPr/>
+        <p:nvPr/>
+      </p:nvGrpSpPr>
+      <p:grpSpPr/>
+      <p:sp>
+        <p:nvSpPr>
+          <p:cNvPr id="4" name="文本占位符 3"/>
+          <p:cNvSpPr>
+            <a:spLocks noGrp="1"/>
+          </p:cNvSpPr>
+          <p:nvPr>
+            <p:ph type="body" sz="quarter" idx="13"/>
+          </p:nvPr>
+        </p:nvSpPr>
+        <p:spPr/>
+        <p:txBody>
+          <a:bodyPr/>
+          <a:p>
+            <a:endParaRPr lang="zh-CN" altLang="en-US" sz="3600"/>
+          </a:p>
+          <a:p>
+            <a:br>
+              <a:rPr lang="zh-CN" altLang="en-US" sz="3600"/>
+            </a:br>
+            <a:r>
+              <a:rPr lang="zh-CN" altLang="en-US">
+                <a:sym typeface="+mn-ea"/>
+              </a:rPr>
+              <a:t>欢迎提问</a:t>
+            </a:r>
+            <a:endParaRPr lang="zh-CN" altLang="en-US"/>
+          </a:p>
+        </p:txBody>
+      </p:sp>
+    </p:spTree>
+  </p:cSld>
+  <p:clrMapOvr>
+    <a:masterClrMapping/>
+  </p:clrMapOvr>
+</p:sld>
+</file>
+
+<file path=ppt/slides/slide36.xml><?xml version="1.0" encoding="utf-8"?>
+<p:sld xmlns:a="http://schemas.openxmlformats.org/drawingml/2006/main" xmlns:r="http://schemas.openxmlformats.org/officeDocument/2006/relationships" xmlns:p="http://schemas.openxmlformats.org/presentationml/2006/main">
+  <p:cSld>
+    <p:spTree>
+      <p:nvGrpSpPr>
+        <p:cNvPr id="1" name=""/>
+        <p:cNvGrpSpPr/>
+        <p:nvPr/>
+      </p:nvGrpSpPr>
+      <p:grpSpPr/>
+      <p:sp>
+        <p:nvSpPr>
+          <p:cNvPr id="4" name="文本占位符 3"/>
+          <p:cNvSpPr>
+            <a:spLocks noGrp="1"/>
+          </p:cNvSpPr>
+          <p:nvPr>
+            <p:ph type="body" sz="quarter" idx="13"/>
+          </p:nvPr>
+        </p:nvSpPr>
+        <p:spPr>
+          <a:xfrm>
+            <a:off x="1368425" y="1206500"/>
+            <a:ext cx="5365750" cy="4104005"/>
+          </a:xfrm>
+        </p:spPr>
+        <p:txBody>
+          <a:bodyPr>
+            <a:normAutofit lnSpcReduction="20000"/>
+          </a:bodyPr>
+          <a:p>
+            <a:endParaRPr lang="zh-CN" altLang="en-US" sz="3600"/>
+          </a:p>
+          <a:p>
+            <a:pPr fontAlgn="auto">
+              <a:spcBef>
+                <a:spcPts val="300"/>
+              </a:spcBef>
+            </a:pPr>
+            <a:br>
+              <a:rPr lang="zh-CN" altLang="en-US" sz="3600">
+                <a:sym typeface="+mn-ea"/>
+              </a:rPr>
+            </a:br>
+            <a:r>
+              <a:rPr lang="zh-CN" altLang="en-US">
+                <a:sym typeface="+mn-ea"/>
+              </a:rPr>
+              <a:t>谢谢大家，玩得开心！</a:t>
+            </a:r>
+            <a:endParaRPr lang="zh-CN" altLang="en-US">
+              <a:sym typeface="+mn-ea"/>
+            </a:endParaRPr>
+          </a:p>
+          <a:p>
+            <a:pPr fontAlgn="auto">
+              <a:spcBef>
+                <a:spcPts val="300"/>
+              </a:spcBef>
+            </a:pPr>
+            <a:r>
+              <a:rPr lang="zh-CN" altLang="en-US" sz="2400"/>
+              <a:t>午饭点欢迎来唠嗑～</a:t>
+            </a:r>
+            <a:endParaRPr lang="zh-CN" altLang="en-US" sz="2400"/>
+          </a:p>
+        </p:txBody>
+      </p:sp>
+    </p:spTree>
+  </p:cSld>
+  <p:clrMapOvr>
+    <a:masterClrMapping/>
+  </p:clrMapOvr>
+</p:sld>
+</file>
+
+<file path=ppt/slides/slide4.xml><?xml version="1.0" encoding="utf-8"?>
+<p:sld xmlns:a="http://schemas.openxmlformats.org/drawingml/2006/main" xmlns:r="http://schemas.openxmlformats.org/officeDocument/2006/relationships" xmlns:p="http://schemas.openxmlformats.org/presentationml/2006/main">
+  <p:cSld>
+    <p:spTree>
+      <p:nvGrpSpPr>
+        <p:cNvPr id="1" name=""/>
+        <p:cNvGrpSpPr/>
+        <p:nvPr/>
+      </p:nvGrpSpPr>
+      <p:grpSpPr/>
+      <p:sp>
+        <p:nvSpPr>
+          <p:cNvPr id="2" name="标题 1"/>
+          <p:cNvSpPr>
+            <a:spLocks noGrp="1"/>
+          </p:cNvSpPr>
+          <p:nvPr>
+            <p:ph type="title"/>
+          </p:nvPr>
+        </p:nvSpPr>
+        <p:spPr/>
+        <p:txBody>
+          <a:bodyPr>
+            <a:normAutofit fontScale="90000"/>
+          </a:bodyPr>
+          <a:p>
+            <a:r>
+              <a:rPr lang="zh-CN" altLang="en-US"/>
+              <a:t>议程概览</a:t>
+            </a:r>
+            <a:endParaRPr lang="zh-CN" altLang="en-US"/>
+          </a:p>
+        </p:txBody>
+      </p:sp>
+      <p:sp>
+        <p:nvSpPr>
+          <p:cNvPr id="3" name="内容占位符 2"/>
+          <p:cNvSpPr>
+            <a:spLocks noGrp="1"/>
+          </p:cNvSpPr>
+          <p:nvPr>
+            <p:ph idx="1"/>
+          </p:nvPr>
+        </p:nvSpPr>
+        <p:spPr/>
+        <p:txBody>
+          <a:bodyPr/>
+          <a:p>
+            <a:r>
+              <a:rPr lang="zh-CN" altLang="en-US"/>
+              <a:t>一线工作者的专业展示、信息共享与社交平台</a:t>
+            </a:r>
+            <a:endParaRPr lang="en-US" altLang="zh-CN"/>
+          </a:p>
+          <a:p>
+            <a:r>
+              <a:rPr lang="en-US" altLang="zh-CN"/>
+              <a:t>19 </a:t>
+            </a:r>
+            <a:r>
+              <a:rPr lang="zh-CN" altLang="en-US"/>
+              <a:t>名讲者，</a:t>
+            </a:r>
+            <a:r>
+              <a:rPr lang="en-US" altLang="zh-CN"/>
+              <a:t>18 </a:t>
+            </a:r>
+            <a:r>
+              <a:rPr lang="zh-CN" altLang="en-US"/>
+              <a:t>个分享课题，</a:t>
+            </a:r>
+            <a:r>
+              <a:rPr lang="en-US" altLang="zh-CN"/>
+              <a:t>4 </a:t>
+            </a:r>
+            <a:r>
+              <a:rPr lang="zh-CN" altLang="en-US"/>
+              <a:t>个主题</a:t>
+            </a:r>
+            <a:endParaRPr lang="zh-CN" altLang="en-US"/>
+          </a:p>
+          <a:p>
+            <a:pPr lvl="1"/>
+            <a:r>
+              <a:rPr lang="zh-CN" altLang="en-US"/>
+              <a:t>社区工作报告与投票</a:t>
+            </a:r>
+            <a:endParaRPr lang="zh-CN" altLang="en-US"/>
+          </a:p>
+          <a:p>
+            <a:pPr lvl="1"/>
+            <a:r>
+              <a:rPr lang="zh-CN" altLang="en-US"/>
+              <a:t>社区与社团运营</a:t>
+            </a:r>
+            <a:endParaRPr lang="zh-CN" altLang="en-US"/>
+          </a:p>
+          <a:p>
+            <a:pPr lvl="1"/>
+            <a:r>
+              <a:rPr lang="zh-CN" altLang="en-US"/>
+              <a:t>从个人到社区的实践</a:t>
+            </a:r>
+            <a:endParaRPr lang="zh-CN" altLang="en-US"/>
+          </a:p>
+          <a:p>
+            <a:pPr lvl="1"/>
+            <a:r>
+              <a:rPr lang="zh-CN" altLang="en-US"/>
+              <a:t>发行版维护与管理</a:t>
+            </a:r>
+            <a:endParaRPr lang="zh-CN" altLang="en-US"/>
+          </a:p>
+          <a:p>
+            <a:pPr lvl="0"/>
+            <a:r>
+              <a:rPr lang="zh-CN" altLang="en-US"/>
+              <a:t>“抽票投奖”和</a:t>
+            </a:r>
+            <a:r>
+              <a:rPr lang="en-US" altLang="zh-CN"/>
+              <a:t> PGP </a:t>
+            </a:r>
+            <a:r>
+              <a:rPr lang="zh-CN" altLang="en-US"/>
+              <a:t>签名会</a:t>
+            </a:r>
+            <a:endParaRPr lang="zh-CN" altLang="en-US"/>
+          </a:p>
+        </p:txBody>
+      </p:sp>
+    </p:spTree>
+  </p:cSld>
+  <p:clrMapOvr>
+    <a:masterClrMapping/>
+  </p:clrMapOvr>
+</p:sld>
+</file>
+
+<file path=ppt/slides/slide5.xml><?xml version="1.0" encoding="utf-8"?>
+<p:sld xmlns:a="http://schemas.openxmlformats.org/drawingml/2006/main" xmlns:r="http://schemas.openxmlformats.org/officeDocument/2006/relationships" xmlns:p="http://schemas.openxmlformats.org/presentationml/2006/main">
+  <p:cSld>
+    <p:bg>
+      <p:bgPr>
+        <a:blipFill dpi="0" rotWithShape="1">
+          <a:blip r:embed="rId1">
+            <a:alphaModFix amt="79000"/>
+            <a:lum/>
+          </a:blip>
+          <a:srcRect/>
+          <a:stretch>
+            <a:fillRect/>
+          </a:stretch>
+        </a:blipFill>
+        <a:effectLst/>
+      </p:bgPr>
+    </p:bg>
+    <p:spTree>
+      <p:nvGrpSpPr>
+        <p:cNvPr id="1" name=""/>
+        <p:cNvGrpSpPr/>
+        <p:nvPr/>
+      </p:nvGrpSpPr>
+      <p:grpSpPr/>
+      <p:sp>
+        <p:nvSpPr>
+          <p:cNvPr id="2" name="标题 1"/>
+          <p:cNvSpPr>
+            <a:spLocks noGrp="1"/>
+          </p:cNvSpPr>
+          <p:nvPr>
+            <p:ph type="title"/>
+          </p:nvPr>
+        </p:nvSpPr>
+        <p:spPr/>
+        <p:txBody>
+          <a:bodyPr>
+            <a:normAutofit fontScale="90000"/>
+          </a:bodyPr>
+          <a:p>
+            <a:r>
+              <a:rPr lang="zh-CN" altLang="en-US"/>
+              <a:t>先啰嗦几句</a:t>
+            </a:r>
+            <a:endParaRPr lang="zh-CN" altLang="en-US"/>
+          </a:p>
+        </p:txBody>
+      </p:sp>
+      <p:sp>
+        <p:nvSpPr>
+          <p:cNvPr id="3" name="内容占位符 2"/>
+          <p:cNvSpPr>
+            <a:spLocks noGrp="1"/>
+          </p:cNvSpPr>
+          <p:nvPr>
+            <p:ph idx="1"/>
+          </p:nvPr>
+        </p:nvSpPr>
+        <p:spPr/>
+        <p:txBody>
+          <a:bodyPr/>
+          <a:p>
+            <a:r>
+              <a:rPr lang="zh-CN" altLang="en-US"/>
+              <a:t>请爱护</a:t>
+            </a:r>
+            <a:r>
+              <a:rPr lang="zh-CN"/>
+              <a:t>社区年度聚会！</a:t>
+            </a:r>
+            <a:endParaRPr lang="zh-CN"/>
+          </a:p>
+          <a:p>
+            <a:pPr lvl="1"/>
+            <a:r>
+              <a:rPr lang="zh-CN">
+                <a:solidFill>
+                  <a:schemeClr val="tx1">
+                    <a:lumMod val="95000"/>
+                    <a:lumOff val="5000"/>
+                  </a:schemeClr>
+                </a:solidFill>
+                <a:uFillTx/>
+              </a:rPr>
+              <a:t>社区贡献者、志愿者和讲者的共同劳动成果</a:t>
+            </a:r>
+            <a:endParaRPr lang="zh-CN">
+              <a:solidFill>
+                <a:schemeClr val="tx1">
+                  <a:lumMod val="95000"/>
+                  <a:lumOff val="5000"/>
+                </a:schemeClr>
+              </a:solidFill>
+              <a:uFillTx/>
+            </a:endParaRPr>
+          </a:p>
+          <a:p>
+            <a:pPr lvl="1"/>
+            <a:r>
+              <a:rPr lang="zh-CN">
+                <a:solidFill>
+                  <a:schemeClr val="tx1">
+                    <a:lumMod val="95000"/>
+                    <a:lumOff val="5000"/>
+                  </a:schemeClr>
+                </a:solidFill>
+                <a:uFillTx/>
+              </a:rPr>
+              <a:t>我们肩负着主办方的信任与支持</a:t>
+            </a:r>
+            <a:endParaRPr lang="zh-CN">
+              <a:solidFill>
+                <a:schemeClr val="tx1">
+                  <a:lumMod val="95000"/>
+                  <a:lumOff val="5000"/>
+                </a:schemeClr>
+              </a:solidFill>
+              <a:uFillTx/>
+            </a:endParaRPr>
+          </a:p>
+          <a:p>
+            <a:pPr lvl="0"/>
+            <a:r>
+              <a:rPr lang="zh-CN">
+                <a:solidFill>
+                  <a:schemeClr val="tx1">
+                    <a:lumMod val="95000"/>
+                    <a:lumOff val="5000"/>
+                  </a:schemeClr>
+                </a:solidFill>
+                <a:uFillTx/>
+              </a:rPr>
+              <a:t>无规矩不成方圆</a:t>
+            </a:r>
+            <a:endParaRPr lang="zh-CN">
+              <a:solidFill>
+                <a:schemeClr val="tx1">
+                  <a:lumMod val="95000"/>
+                  <a:lumOff val="5000"/>
+                </a:schemeClr>
+              </a:solidFill>
+              <a:uFillTx/>
+            </a:endParaRPr>
+          </a:p>
+          <a:p>
+            <a:pPr lvl="1"/>
+            <a:r>
+              <a:rPr lang="zh-CN">
+                <a:solidFill>
+                  <a:schemeClr val="tx1">
+                    <a:lumMod val="95000"/>
+                    <a:lumOff val="5000"/>
+                  </a:schemeClr>
+                </a:solidFill>
+                <a:uFillTx/>
+              </a:rPr>
+              <a:t>请时刻听从志愿者们的指引！</a:t>
+            </a:r>
+            <a:endParaRPr lang="zh-CN">
+              <a:solidFill>
+                <a:schemeClr val="tx1">
+                  <a:lumMod val="95000"/>
+                  <a:lumOff val="5000"/>
+                </a:schemeClr>
+              </a:solidFill>
+              <a:uFillTx/>
+            </a:endParaRPr>
+          </a:p>
+          <a:p>
+            <a:pPr lvl="1"/>
+            <a:r>
+              <a:rPr lang="zh-CN">
+                <a:solidFill>
+                  <a:schemeClr val="tx1">
+                    <a:lumMod val="95000"/>
+                    <a:lumOff val="5000"/>
+                  </a:schemeClr>
+                </a:solidFill>
+                <a:uFillTx/>
+              </a:rPr>
+              <a:t>注意保持卫生</a:t>
+            </a:r>
+            <a:endParaRPr lang="zh-CN">
+              <a:solidFill>
+                <a:schemeClr val="tx1">
+                  <a:lumMod val="95000"/>
+                  <a:lumOff val="5000"/>
+                </a:schemeClr>
+              </a:solidFill>
+              <a:uFillTx/>
+            </a:endParaRPr>
+          </a:p>
+          <a:p>
+            <a:pPr lvl="1"/>
+            <a:r>
+              <a:rPr lang="zh-CN">
+                <a:solidFill>
+                  <a:schemeClr val="tx1">
+                    <a:lumMod val="95000"/>
+                    <a:lumOff val="5000"/>
+                  </a:schemeClr>
+                </a:solidFill>
+                <a:uFillTx/>
+              </a:rPr>
+              <a:t>自觉维护会场秩序，有序提问和参与活动</a:t>
+            </a:r>
+            <a:endParaRPr lang="zh-CN">
+              <a:solidFill>
+                <a:schemeClr val="tx1">
+                  <a:lumMod val="95000"/>
+                  <a:lumOff val="5000"/>
+                </a:schemeClr>
+              </a:solidFill>
+              <a:uFillTx/>
+            </a:endParaRPr>
+          </a:p>
+          <a:p>
+            <a:pPr lvl="1"/>
+            <a:r>
+              <a:rPr lang="zh-CN">
+                <a:solidFill>
+                  <a:schemeClr val="tx1">
+                    <a:lumMod val="95000"/>
+                    <a:lumOff val="5000"/>
+                  </a:schemeClr>
+                </a:solidFill>
+                <a:uFillTx/>
+              </a:rPr>
+              <a:t>尊重他人、讲者和自己</a:t>
+            </a:r>
+            <a:endParaRPr lang="zh-CN">
+              <a:solidFill>
+                <a:schemeClr val="tx1">
+                  <a:lumMod val="95000"/>
+                  <a:lumOff val="5000"/>
+                </a:schemeClr>
+              </a:solidFill>
+              <a:uFillTx/>
+            </a:endParaRPr>
+          </a:p>
+        </p:txBody>
+      </p:sp>
+    </p:spTree>
+  </p:cSld>
+  <p:clrMapOvr>
+    <a:masterClrMapping/>
+  </p:clrMapOvr>
+</p:sld>
+</file>
+
+<file path=ppt/slides/slide6.xml><?xml version="1.0" encoding="utf-8"?>
+<p:sld xmlns:a="http://schemas.openxmlformats.org/drawingml/2006/main" xmlns:r="http://schemas.openxmlformats.org/officeDocument/2006/relationships" xmlns:p="http://schemas.openxmlformats.org/presentationml/2006/main">
+  <p:cSld>
+    <p:spTree>
+      <p:nvGrpSpPr>
+        <p:cNvPr id="1" name=""/>
+        <p:cNvGrpSpPr/>
+        <p:nvPr/>
+      </p:nvGrpSpPr>
+      <p:grpSpPr/>
+      <p:sp>
+        <p:nvSpPr>
+          <p:cNvPr id="4" name="文本占位符 3"/>
+          <p:cNvSpPr>
+            <a:spLocks noGrp="1"/>
+          </p:cNvSpPr>
+          <p:nvPr>
+            <p:ph type="body" sz="quarter" idx="13"/>
+          </p:nvPr>
+        </p:nvSpPr>
+        <p:spPr/>
+        <p:txBody>
+          <a:bodyPr/>
+          <a:p>
+            <a:endParaRPr lang="zh-CN" altLang="en-US" sz="3600"/>
+          </a:p>
+          <a:p>
+            <a:br>
+              <a:rPr lang="zh-CN" altLang="en-US" sz="3600"/>
+            </a:br>
+            <a:r>
+              <a:rPr lang="zh-CN" altLang="en-US"/>
+              <a:t>他咋那么啰嗦啊！</a:t>
+            </a:r>
+            <a:endParaRPr lang="zh-CN" altLang="en-US"/>
+          </a:p>
+        </p:txBody>
+      </p:sp>
+    </p:spTree>
+  </p:cSld>
+  <p:clrMapOvr>
+    <a:masterClrMapping/>
+  </p:clrMapOvr>
+</p:sld>
+</file>
+
+<file path=ppt/slides/slide7.xml><?xml version="1.0" encoding="utf-8"?>
+<p:sld xmlns:a="http://schemas.openxmlformats.org/drawingml/2006/main" xmlns:r="http://schemas.openxmlformats.org/officeDocument/2006/relationships" xmlns:p="http://schemas.openxmlformats.org/presentationml/2006/main">
+  <p:cSld>
+    <p:spTree>
+      <p:nvGrpSpPr>
+        <p:cNvPr id="1" name=""/>
+        <p:cNvGrpSpPr/>
+        <p:nvPr/>
+      </p:nvGrpSpPr>
+      <p:grpSpPr/>
+      <p:sp>
+        <p:nvSpPr>
+          <p:cNvPr id="6" name="标题 5"/>
+          <p:cNvSpPr>
+            <a:spLocks noGrp="1"/>
+          </p:cNvSpPr>
+          <p:nvPr>
+            <p:ph type="title"/>
+          </p:nvPr>
+        </p:nvSpPr>
+        <p:spPr/>
+        <p:txBody>
+          <a:bodyPr>
+            <a:normAutofit fontScale="90000"/>
+          </a:bodyPr>
+          <a:p>
+            <a:r>
+              <a:rPr lang="zh-CN" altLang="en-US"/>
+              <a:t>进化</a:t>
+            </a:r>
+            <a:r>
+              <a:rPr lang="zh-CN" altLang="en-US">
+                <a:sym typeface="+mn-ea"/>
+              </a:rPr>
+              <a:t>与转折</a:t>
+            </a:r>
+            <a:r>
+              <a:rPr lang="zh-CN" altLang="en-US"/>
+              <a:t>中的社区</a:t>
+            </a:r>
+            <a:endParaRPr altLang="zh-CN"/>
+          </a:p>
+        </p:txBody>
+      </p:sp>
+      <p:sp>
+        <p:nvSpPr>
+          <p:cNvPr id="7" name="内容占位符 6"/>
+          <p:cNvSpPr>
+            <a:spLocks noGrp="1"/>
+          </p:cNvSpPr>
+          <p:nvPr>
+            <p:ph idx="1"/>
+          </p:nvPr>
+        </p:nvSpPr>
+        <p:spPr/>
+        <p:txBody>
+          <a:bodyPr/>
+          <a:p>
+            <a:r>
+              <a:rPr lang="zh-CN" altLang="en-US"/>
+              <a:t>在过去一年，社区的工作收效甚丰</a:t>
+            </a:r>
+            <a:endParaRPr lang="en-US" altLang="zh-CN"/>
+          </a:p>
+          <a:p>
+            <a:pPr lvl="1"/>
+            <a:r>
+              <a:rPr lang="zh-CN" altLang="en-US"/>
+              <a:t>重启了外宣工作并初见成效</a:t>
+            </a:r>
+            <a:endParaRPr lang="zh-CN" altLang="en-US"/>
+          </a:p>
+          <a:p>
+            <a:pPr lvl="1"/>
+            <a:r>
+              <a:rPr lang="zh-CN" altLang="en-US"/>
+              <a:t>实现了高水平的自动化设施</a:t>
+            </a:r>
+            <a:endParaRPr lang="zh-CN" altLang="en-US"/>
+          </a:p>
+          <a:p>
+            <a:pPr lvl="1"/>
+            <a:r>
+              <a:rPr lang="zh-CN" altLang="en-US"/>
+              <a:t>告别了用户比开发者少的“诅咒”</a:t>
+            </a:r>
+            <a:endParaRPr lang="zh-CN" altLang="en-US"/>
+          </a:p>
+          <a:p>
+            <a:pPr lvl="1"/>
+            <a:r>
+              <a:rPr lang="zh-CN" altLang="en-US"/>
+              <a:t>迎来了安装体验的完善调优</a:t>
+            </a:r>
+            <a:endParaRPr lang="zh-CN" altLang="en-US"/>
+          </a:p>
+          <a:p>
+            <a:pPr lvl="1"/>
+            <a:r>
+              <a:rPr lang="zh-CN" altLang="en-US"/>
+              <a:t>见证了十余年未见的高速膨胀</a:t>
+            </a:r>
+            <a:endParaRPr lang="zh-CN" altLang="en-US"/>
+          </a:p>
+          <a:p>
+            <a:pPr lvl="0"/>
+            <a:r>
+              <a:rPr lang="zh-CN" altLang="en-US"/>
+              <a:t>与此同时，社区工作面临“超速过热”的挑战</a:t>
+            </a:r>
+            <a:endParaRPr lang="zh-CN" altLang="en-US"/>
+          </a:p>
+          <a:p>
+            <a:pPr lvl="1"/>
+            <a:r>
+              <a:rPr lang="zh-CN" altLang="en-US"/>
+              <a:t>如何让社区组织与工作能力一同进化？</a:t>
+            </a:r>
+            <a:endParaRPr lang="zh-CN" altLang="en-US"/>
+          </a:p>
+        </p:txBody>
+      </p:sp>
+    </p:spTree>
+  </p:cSld>
+  <p:clrMapOvr>
+    <a:masterClrMapping/>
+  </p:clrMapOvr>
+</p:sld>
+</file>
+
+<file path=ppt/slides/slide8.xml><?xml version="1.0" encoding="utf-8"?>
+<p:sld xmlns:a="http://schemas.openxmlformats.org/drawingml/2006/main" xmlns:r="http://schemas.openxmlformats.org/officeDocument/2006/relationships" xmlns:p="http://schemas.openxmlformats.org/presentationml/2006/main">
+  <p:cSld>
+    <p:spTree>
+      <p:nvGrpSpPr>
+        <p:cNvPr id="1" name=""/>
+        <p:cNvGrpSpPr/>
+        <p:nvPr/>
+      </p:nvGrpSpPr>
+      <p:grpSpPr/>
+      <p:sp>
+        <p:nvSpPr>
+          <p:cNvPr id="2" name="标题 1"/>
+          <p:cNvSpPr>
+            <a:spLocks noGrp="1"/>
+          </p:cNvSpPr>
+          <p:nvPr>
+            <p:ph type="title"/>
+          </p:nvPr>
+        </p:nvSpPr>
+        <p:spPr/>
+        <p:txBody>
+          <a:bodyPr>
+            <a:normAutofit fontScale="90000"/>
+          </a:bodyPr>
+          <a:p>
+            <a:r>
+              <a:rPr lang="zh-CN" altLang="en-US"/>
+              <a:t>摘要：从数据看社区工作</a:t>
+            </a:r>
+            <a:endParaRPr lang="zh-CN" altLang="en-US"/>
+          </a:p>
+        </p:txBody>
+      </p:sp>
+      <p:sp>
+        <p:nvSpPr>
+          <p:cNvPr id="3" name="内容占位符 2"/>
+          <p:cNvSpPr>
+            <a:spLocks noGrp="1"/>
+          </p:cNvSpPr>
+          <p:nvPr>
+            <p:ph idx="1"/>
+          </p:nvPr>
+        </p:nvSpPr>
+        <p:spPr/>
+        <p:txBody>
+          <a:bodyPr/>
+          <a:p>
+            <a:r>
+              <a:rPr lang="zh-CN" altLang="en-US"/>
+              <a:t>参与社区项目维护的贡献者共</a:t>
+            </a:r>
+            <a:r>
+              <a:rPr lang="en-US" altLang="zh-CN"/>
+              <a:t> 50 </a:t>
+            </a:r>
+            <a:r>
+              <a:rPr lang="zh-CN" altLang="en-US"/>
+              <a:t>人</a:t>
+            </a:r>
+            <a:endParaRPr lang="zh-CN" altLang="en-US"/>
+          </a:p>
+          <a:p>
+            <a:r>
+              <a:rPr lang="zh-CN" altLang="en-US"/>
+              <a:t>软件包树年提交</a:t>
+            </a:r>
+            <a:r>
+              <a:rPr lang="en-US" altLang="zh-CN"/>
+              <a:t> 5,677 </a:t>
+            </a:r>
+            <a:r>
+              <a:rPr lang="zh-CN" altLang="en-US"/>
+              <a:t>个</a:t>
+            </a:r>
+            <a:endParaRPr lang="zh-CN" altLang="en-US"/>
+          </a:p>
+          <a:p>
+            <a:pPr lvl="1"/>
+            <a:r>
+              <a:rPr lang="zh-CN" altLang="en-US"/>
+              <a:t>总提交数逼近</a:t>
+            </a:r>
+            <a:r>
+              <a:rPr lang="en-US" altLang="zh-CN"/>
+              <a:t> 100,000 </a:t>
+            </a:r>
+            <a:r>
+              <a:rPr lang="zh-CN" altLang="en-US"/>
+              <a:t>个</a:t>
+            </a:r>
+            <a:endParaRPr lang="zh-CN" altLang="en-US"/>
+          </a:p>
+          <a:p>
+            <a:pPr lvl="0"/>
+            <a:r>
+              <a:rPr lang="zh-CN" altLang="en-US"/>
+              <a:t>新增一级架构移植</a:t>
+            </a:r>
+            <a:r>
+              <a:rPr lang="en-US" altLang="zh-CN"/>
+              <a:t> 1 </a:t>
+            </a:r>
+            <a:r>
+              <a:rPr lang="zh-CN" altLang="en-US"/>
+              <a:t>个</a:t>
+            </a:r>
+            <a:endParaRPr lang="zh-CN" altLang="en-US"/>
+          </a:p>
+          <a:p>
+            <a:r>
+              <a:rPr lang="zh-CN" altLang="en-US">
+                <a:sym typeface="+mn-ea"/>
+              </a:rPr>
+              <a:t>新增构建服务器</a:t>
+            </a:r>
+            <a:r>
+              <a:rPr lang="en-US" altLang="zh-CN">
+                <a:sym typeface="+mn-ea"/>
+              </a:rPr>
+              <a:t> 13 </a:t>
+            </a:r>
+            <a:r>
+              <a:rPr lang="zh-CN" altLang="en-US">
+                <a:sym typeface="+mn-ea"/>
+              </a:rPr>
+              <a:t>台</a:t>
+            </a:r>
+            <a:endParaRPr lang="zh-CN" altLang="en-US"/>
+          </a:p>
+          <a:p>
+            <a:r>
+              <a:rPr lang="zh-CN" altLang="en-US">
+                <a:sym typeface="+mn-ea"/>
+              </a:rPr>
+              <a:t>新增镜像源</a:t>
+            </a:r>
+            <a:r>
+              <a:rPr lang="en-US" altLang="zh-CN">
+                <a:sym typeface="+mn-ea"/>
+              </a:rPr>
+              <a:t> 4 </a:t>
+            </a:r>
+            <a:r>
+              <a:rPr lang="zh-CN" altLang="en-US">
+                <a:sym typeface="+mn-ea"/>
+              </a:rPr>
+              <a:t>个</a:t>
+            </a:r>
+            <a:endParaRPr lang="zh-CN" altLang="en-US"/>
+          </a:p>
+          <a:p>
+            <a:r>
+              <a:rPr lang="zh-CN" altLang="en-US"/>
+              <a:t>双周报《安记冰室》共发行</a:t>
+            </a:r>
+            <a:r>
+              <a:rPr lang="en-US" altLang="zh-CN"/>
+              <a:t> 18 </a:t>
+            </a:r>
+            <a:r>
+              <a:rPr lang="zh-CN" altLang="en-US"/>
+              <a:t>期</a:t>
+            </a:r>
+            <a:endParaRPr lang="zh-CN" altLang="en-US"/>
+          </a:p>
+        </p:txBody>
+      </p:sp>
+    </p:spTree>
+  </p:cSld>
+  <p:clrMapOvr>
+    <a:masterClrMapping/>
+  </p:clrMapOvr>
+</p:sld>
+</file>
+
+<file path=ppt/slides/slide9.xml><?xml version="1.0" encoding="utf-8"?>
+<p:sld xmlns:a="http://schemas.openxmlformats.org/drawingml/2006/main" xmlns:r="http://schemas.openxmlformats.org/officeDocument/2006/relationships" xmlns:p="http://schemas.openxmlformats.org/presentationml/2006/main">
+  <p:cSld>
+    <p:spTree>
+      <p:nvGrpSpPr>
+        <p:cNvPr id="1" name=""/>
+        <p:cNvGrpSpPr/>
+        <p:nvPr/>
+      </p:nvGrpSpPr>
+      <p:grpSpPr/>
+      <p:sp>
+        <p:nvSpPr>
+          <p:cNvPr id="2" name="标题 1"/>
+          <p:cNvSpPr>
+            <a:spLocks noGrp="1"/>
+          </p:cNvSpPr>
+          <p:nvPr>
+            <p:ph type="title"/>
+          </p:nvPr>
+        </p:nvSpPr>
+        <p:spPr/>
+        <p:txBody>
+          <a:bodyPr>
+            <a:normAutofit fontScale="90000"/>
+          </a:bodyPr>
+          <a:p>
+            <a:r>
+              <a:rPr lang="zh-CN" altLang="en-US"/>
+              <a:t>摘要：架构支持</a:t>
+            </a:r>
+            <a:endParaRPr altLang="zh-CN"/>
+          </a:p>
+        </p:txBody>
+      </p:sp>
+      <p:sp>
+        <p:nvSpPr>
+          <p:cNvPr id="5" name="内容占位符 4"/>
+          <p:cNvSpPr/>
+          <p:nvPr>
+            <p:ph idx="1"/>
+          </p:nvPr>
+        </p:nvSpPr>
+        <p:spPr/>
+        <p:txBody>
+          <a:bodyPr/>
+          <a:p>
+            <a:endParaRPr lang="zh-CN" altLang="en-US"/>
+          </a:p>
+        </p:txBody>
+      </p:sp>
+    </p:spTree>
+  </p:cSld>
+  <p:clrMapOvr>
+    <a:masterClrMapping/>
+  </p:clrMapOvr>
+</p:sld>
 </file>
 
 <file path=ppt/theme/theme1.xml><?xml version="1.0" encoding="utf-8"?>

</xml_diff>